<commit_message>
[Feat] Adiciona alertas nos formularios e diagram. com compoentes
</commit_message>
<xml_diff>
--- a/documentacao/desenho-de-solução/Solucao_do_Projeto_com_Containers_componentes.pptx
+++ b/documentacao/desenho-de-solução/Solucao_do_Projeto_com_Containers_componentes.pptx
@@ -244,7 +244,7 @@
           <a:p>
             <a:fld id="{C0C7093E-3454-4D60-86CF-1DF1D2C66BEB}" type="datetimeFigureOut">
               <a:rPr lang="pt-BR" smtClean="0"/>
-              <a:t>25/11/2021</a:t>
+              <a:t>27/11/2021</a:t>
             </a:fld>
             <a:endParaRPr lang="pt-BR"/>
           </a:p>
@@ -409,7 +409,7 @@
           <a:p>
             <a:fld id="{C0C7093E-3454-4D60-86CF-1DF1D2C66BEB}" type="datetimeFigureOut">
               <a:rPr lang="pt-BR" smtClean="0"/>
-              <a:t>25/11/2021</a:t>
+              <a:t>27/11/2021</a:t>
             </a:fld>
             <a:endParaRPr lang="pt-BR"/>
           </a:p>
@@ -584,7 +584,7 @@
           <a:p>
             <a:fld id="{C0C7093E-3454-4D60-86CF-1DF1D2C66BEB}" type="datetimeFigureOut">
               <a:rPr lang="pt-BR" smtClean="0"/>
-              <a:t>25/11/2021</a:t>
+              <a:t>27/11/2021</a:t>
             </a:fld>
             <a:endParaRPr lang="pt-BR"/>
           </a:p>
@@ -749,7 +749,7 @@
           <a:p>
             <a:fld id="{C0C7093E-3454-4D60-86CF-1DF1D2C66BEB}" type="datetimeFigureOut">
               <a:rPr lang="pt-BR" smtClean="0"/>
-              <a:t>25/11/2021</a:t>
+              <a:t>27/11/2021</a:t>
             </a:fld>
             <a:endParaRPr lang="pt-BR"/>
           </a:p>
@@ -990,7 +990,7 @@
           <a:p>
             <a:fld id="{C0C7093E-3454-4D60-86CF-1DF1D2C66BEB}" type="datetimeFigureOut">
               <a:rPr lang="pt-BR" smtClean="0"/>
-              <a:t>25/11/2021</a:t>
+              <a:t>27/11/2021</a:t>
             </a:fld>
             <a:endParaRPr lang="pt-BR"/>
           </a:p>
@@ -1217,7 +1217,7 @@
           <a:p>
             <a:fld id="{C0C7093E-3454-4D60-86CF-1DF1D2C66BEB}" type="datetimeFigureOut">
               <a:rPr lang="pt-BR" smtClean="0"/>
-              <a:t>25/11/2021</a:t>
+              <a:t>27/11/2021</a:t>
             </a:fld>
             <a:endParaRPr lang="pt-BR"/>
           </a:p>
@@ -1579,7 +1579,7 @@
           <a:p>
             <a:fld id="{C0C7093E-3454-4D60-86CF-1DF1D2C66BEB}" type="datetimeFigureOut">
               <a:rPr lang="pt-BR" smtClean="0"/>
-              <a:t>25/11/2021</a:t>
+              <a:t>27/11/2021</a:t>
             </a:fld>
             <a:endParaRPr lang="pt-BR"/>
           </a:p>
@@ -1692,7 +1692,7 @@
           <a:p>
             <a:fld id="{C0C7093E-3454-4D60-86CF-1DF1D2C66BEB}" type="datetimeFigureOut">
               <a:rPr lang="pt-BR" smtClean="0"/>
-              <a:t>25/11/2021</a:t>
+              <a:t>27/11/2021</a:t>
             </a:fld>
             <a:endParaRPr lang="pt-BR"/>
           </a:p>
@@ -1782,7 +1782,7 @@
           <a:p>
             <a:fld id="{C0C7093E-3454-4D60-86CF-1DF1D2C66BEB}" type="datetimeFigureOut">
               <a:rPr lang="pt-BR" smtClean="0"/>
-              <a:t>25/11/2021</a:t>
+              <a:t>27/11/2021</a:t>
             </a:fld>
             <a:endParaRPr lang="pt-BR"/>
           </a:p>
@@ -2054,7 +2054,7 @@
           <a:p>
             <a:fld id="{C0C7093E-3454-4D60-86CF-1DF1D2C66BEB}" type="datetimeFigureOut">
               <a:rPr lang="pt-BR" smtClean="0"/>
-              <a:t>25/11/2021</a:t>
+              <a:t>27/11/2021</a:t>
             </a:fld>
             <a:endParaRPr lang="pt-BR"/>
           </a:p>
@@ -2306,7 +2306,7 @@
           <a:p>
             <a:fld id="{C0C7093E-3454-4D60-86CF-1DF1D2C66BEB}" type="datetimeFigureOut">
               <a:rPr lang="pt-BR" smtClean="0"/>
-              <a:t>25/11/2021</a:t>
+              <a:t>27/11/2021</a:t>
             </a:fld>
             <a:endParaRPr lang="pt-BR"/>
           </a:p>
@@ -2514,7 +2514,7 @@
           <a:p>
             <a:fld id="{C0C7093E-3454-4D60-86CF-1DF1D2C66BEB}" type="datetimeFigureOut">
               <a:rPr lang="pt-BR" smtClean="0"/>
-              <a:t>25/11/2021</a:t>
+              <a:t>27/11/2021</a:t>
             </a:fld>
             <a:endParaRPr lang="pt-BR"/>
           </a:p>
@@ -5457,7 +5457,7 @@
         </p:nvSpPr>
         <p:spPr>
           <a:xfrm>
-            <a:off x="352425" y="974361"/>
+            <a:off x="232558" y="1124912"/>
             <a:ext cx="2426120" cy="1904818"/>
           </a:xfrm>
           <a:prstGeom prst="flowChartMagneticDisk">
@@ -5512,8 +5512,8 @@
         </p:nvSpPr>
         <p:spPr>
           <a:xfrm>
-            <a:off x="389733" y="1584812"/>
-            <a:ext cx="2199537" cy="477054"/>
+            <a:off x="357059" y="1803342"/>
+            <a:ext cx="2151424" cy="523220"/>
           </a:xfrm>
           <a:prstGeom prst="rect">
             <a:avLst/>
@@ -5529,7 +5529,7 @@
               <a:defRPr/>
             </a:pPr>
             <a:r>
-              <a:rPr lang="pt-BR" sz="1400" b="1" dirty="0"/>
+              <a:rPr lang="pt-BR" sz="1600" b="1" dirty="0"/>
               <a:t>Database</a:t>
             </a:r>
           </a:p>
@@ -5538,10 +5538,10 @@
               <a:defRPr/>
             </a:pPr>
             <a:r>
-              <a:rPr lang="pt-BR" sz="1100" dirty="0"/>
+              <a:rPr lang="pt-BR" sz="1200" dirty="0"/>
               <a:t>[Container: SQL Server + Azure]</a:t>
             </a:r>
-            <a:endParaRPr lang="pt-BR" sz="1100" dirty="0">
+            <a:endParaRPr lang="pt-BR" sz="1200" dirty="0">
               <a:cs typeface="Calibri"/>
             </a:endParaRPr>
           </a:p>
@@ -5555,8 +5555,8 @@
         </p:nvSpPr>
         <p:spPr>
           <a:xfrm>
-            <a:off x="458510" y="2122278"/>
-            <a:ext cx="2061982" cy="600164"/>
+            <a:off x="350969" y="2326562"/>
+            <a:ext cx="2157474" cy="600164"/>
           </a:xfrm>
           <a:prstGeom prst="rect">
             <a:avLst/>
@@ -5587,10 +5587,10 @@
         </p:nvGrpSpPr>
         <p:grpSpPr>
           <a:xfrm>
-            <a:off x="7225771" y="1237584"/>
-            <a:ext cx="2494270" cy="1603637"/>
-            <a:chOff x="3622567" y="4843322"/>
-            <a:chExt cx="2807827" cy="2050628"/>
+            <a:off x="6495068" y="1290077"/>
+            <a:ext cx="2407793" cy="1576732"/>
+            <a:chOff x="3676482" y="4877728"/>
+            <a:chExt cx="2710479" cy="2016224"/>
           </a:xfrm>
         </p:grpSpPr>
         <p:sp>
@@ -5601,7 +5601,7 @@
           </p:nvSpPr>
           <p:spPr>
             <a:xfrm>
-              <a:off x="3676487" y="4877726"/>
+              <a:off x="3676487" y="4877728"/>
               <a:ext cx="2710474" cy="2016224"/>
             </a:xfrm>
             <a:prstGeom prst="rect">
@@ -5639,7 +5639,7 @@
             <a:lstStyle/>
             <a:p>
               <a:pPr algn="ctr"/>
-              <a:endParaRPr lang="pt-BR" sz="1600">
+              <a:endParaRPr lang="pt-BR" sz="1600" dirty="0">
                 <a:solidFill>
                   <a:prstClr val="white"/>
                 </a:solidFill>
@@ -5656,8 +5656,8 @@
           </p:nvSpPr>
           <p:spPr>
             <a:xfrm>
-              <a:off x="3939006" y="5580947"/>
-              <a:ext cx="2278425" cy="803878"/>
+              <a:off x="3892510" y="5743939"/>
+              <a:ext cx="2278426" cy="767451"/>
             </a:xfrm>
             <a:prstGeom prst="rect">
               <a:avLst/>
@@ -5673,7 +5673,7 @@
                 <a:defRPr/>
               </a:pPr>
               <a:r>
-                <a:rPr lang="pt-BR" sz="1200" dirty="0">
+                <a:rPr lang="pt-BR" sz="1100" dirty="0">
                   <a:solidFill>
                     <a:prstClr val="white"/>
                   </a:solidFill>
@@ -5691,8 +5691,8 @@
           </p:nvSpPr>
           <p:spPr>
             <a:xfrm>
-              <a:off x="3622567" y="4843322"/>
-              <a:ext cx="2807827" cy="650757"/>
+              <a:off x="3676482" y="4996402"/>
+              <a:ext cx="2710479" cy="629705"/>
             </a:xfrm>
             <a:prstGeom prst="rect">
               <a:avLst/>
@@ -5708,7 +5708,7 @@
                 <a:defRPr/>
               </a:pPr>
               <a:r>
-                <a:rPr lang="pt-BR" sz="1600" b="1" dirty="0">
+                <a:rPr lang="pt-BR" sz="1400" b="1" dirty="0">
                   <a:solidFill>
                     <a:prstClr val="white"/>
                   </a:solidFill>
@@ -5726,23 +5726,7 @@
                     <a:prstClr val="white"/>
                   </a:solidFill>
                 </a:rPr>
-                <a:t>[</a:t>
-              </a:r>
-              <a:r>
-                <a:rPr lang="pt-BR" sz="1200" dirty="0" err="1">
-                  <a:solidFill>
-                    <a:prstClr val="white"/>
-                  </a:solidFill>
-                </a:rPr>
-                <a:t>Component</a:t>
-              </a:r>
-              <a:r>
-                <a:rPr lang="pt-BR" sz="1200" dirty="0">
-                  <a:solidFill>
-                    <a:prstClr val="white"/>
-                  </a:solidFill>
-                </a:rPr>
-                <a:t>: JPA]</a:t>
+                <a:t>[Component: JPA]</a:t>
               </a:r>
             </a:p>
           </p:txBody>
@@ -5756,10 +5740,10 @@
         </p:nvGrpSpPr>
         <p:grpSpPr>
           <a:xfrm>
-            <a:off x="5509608" y="4230987"/>
-            <a:ext cx="2073863" cy="1310769"/>
-            <a:chOff x="8771659" y="1515280"/>
-            <a:chExt cx="2620499" cy="2016224"/>
+            <a:off x="5397755" y="4230987"/>
+            <a:ext cx="2032928" cy="1310769"/>
+            <a:chOff x="8733794" y="1515280"/>
+            <a:chExt cx="2568774" cy="2016224"/>
           </a:xfrm>
         </p:grpSpPr>
         <p:sp>
@@ -5815,8 +5799,8 @@
           </p:nvSpPr>
           <p:spPr>
             <a:xfrm>
-              <a:off x="8771659" y="1679200"/>
-              <a:ext cx="2566457" cy="575842"/>
+              <a:off x="8736111" y="1680327"/>
+              <a:ext cx="2566457" cy="710133"/>
             </a:xfrm>
             <a:prstGeom prst="rect">
               <a:avLst/>
@@ -5832,7 +5816,7 @@
                 <a:defRPr/>
               </a:pPr>
               <a:r>
-                <a:rPr lang="pt-PT" altLang="pt-BR" sz="1600" b="1" dirty="0">
+                <a:rPr lang="pt-PT" altLang="pt-BR" sz="1200" b="1" dirty="0">
                   <a:solidFill>
                     <a:prstClr val="white"/>
                   </a:solidFill>
@@ -5840,26 +5824,13 @@
                 <a:t>Quadra</a:t>
               </a:r>
               <a:r>
-                <a:rPr lang="pt-BR" sz="1600" b="1" dirty="0">
-                  <a:solidFill>
-                    <a:prstClr val="white"/>
-                  </a:solidFill>
-                </a:rPr>
-                <a:t> </a:t>
-              </a:r>
-              <a:r>
-                <a:rPr lang="pt-BR" sz="1600" b="1" dirty="0" err="1">
+                <a:rPr lang="pt-BR" sz="1200" b="1" dirty="0">
                   <a:solidFill>
                     <a:prstClr val="white"/>
                   </a:solidFill>
                 </a:rPr>
                 <a:t>Controller</a:t>
               </a:r>
-              <a:endParaRPr lang="pt-BR" sz="1600" b="1" dirty="0">
-                <a:solidFill>
-                  <a:prstClr val="white"/>
-                </a:solidFill>
-              </a:endParaRPr>
             </a:p>
             <a:p>
               <a:pPr lvl="0" algn="ctr">
@@ -5871,55 +5842,7 @@
                     <a:prstClr val="white"/>
                   </a:solidFill>
                 </a:rPr>
-                <a:t>[</a:t>
-              </a:r>
-              <a:r>
-                <a:rPr lang="pt-BR" sz="1200" dirty="0" err="1">
-                  <a:solidFill>
-                    <a:prstClr val="white"/>
-                  </a:solidFill>
-                </a:rPr>
-                <a:t>Component</a:t>
-              </a:r>
-              <a:r>
-                <a:rPr lang="pt-BR" sz="1200" dirty="0">
-                  <a:solidFill>
-                    <a:prstClr val="white"/>
-                  </a:solidFill>
-                </a:rPr>
-                <a:t>: </a:t>
-              </a:r>
-              <a:r>
-                <a:rPr lang="pt-BR" sz="1200" dirty="0" err="1">
-                  <a:solidFill>
-                    <a:prstClr val="white"/>
-                  </a:solidFill>
-                </a:rPr>
-                <a:t>Rest</a:t>
-              </a:r>
-              <a:r>
-                <a:rPr lang="pt-BR" sz="1200" dirty="0">
-                  <a:solidFill>
-                    <a:prstClr val="white"/>
-                  </a:solidFill>
-                </a:rPr>
-                <a:t> </a:t>
-              </a:r>
-              <a:r>
-                <a:rPr lang="pt-BR" sz="1200" dirty="0" err="1">
-                  <a:solidFill>
-                    <a:prstClr val="white"/>
-                  </a:solidFill>
-                </a:rPr>
-                <a:t>Controller</a:t>
-              </a:r>
-              <a:r>
-                <a:rPr lang="pt-BR" sz="1200" dirty="0">
-                  <a:solidFill>
-                    <a:prstClr val="white"/>
-                  </a:solidFill>
-                </a:rPr>
-                <a:t>]</a:t>
+                <a:t>[Component: Rest Controller]</a:t>
               </a:r>
             </a:p>
           </p:txBody>
@@ -5932,8 +5855,8 @@
           </p:nvSpPr>
           <p:spPr>
             <a:xfrm>
-              <a:off x="8825701" y="2920027"/>
-              <a:ext cx="2566457" cy="304857"/>
+              <a:off x="8733794" y="2523391"/>
+              <a:ext cx="2566456" cy="662790"/>
             </a:xfrm>
             <a:prstGeom prst="rect">
               <a:avLst/>
@@ -5949,12 +5872,12 @@
                 <a:defRPr/>
               </a:pPr>
               <a:r>
-                <a:rPr lang="pt-PT" altLang="pt-BR" sz="1200" dirty="0">
+                <a:rPr lang="pt-PT" altLang="pt-BR" sz="1100" dirty="0">
                   <a:solidFill>
                     <a:prstClr val="white"/>
                   </a:solidFill>
                 </a:rPr>
-                <a:t>Controle de Quadras</a:t>
+                <a:t>Controle das requisições da entidade Quadra</a:t>
               </a:r>
             </a:p>
           </p:txBody>
@@ -5968,10 +5891,10 @@
         </p:nvGrpSpPr>
         <p:grpSpPr>
           <a:xfrm>
-            <a:off x="7703553" y="4252482"/>
-            <a:ext cx="2294803" cy="1327125"/>
-            <a:chOff x="8846050" y="1558509"/>
-            <a:chExt cx="2767033" cy="2016224"/>
+            <a:off x="7581702" y="4252482"/>
+            <a:ext cx="2135317" cy="1327125"/>
+            <a:chOff x="8797862" y="1558509"/>
+            <a:chExt cx="2574728" cy="2016224"/>
           </a:xfrm>
         </p:grpSpPr>
         <p:sp>
@@ -6027,8 +5950,8 @@
           </p:nvSpPr>
           <p:spPr>
             <a:xfrm>
-              <a:off x="8846050" y="1605858"/>
-              <a:ext cx="2566458" cy="836390"/>
+              <a:off x="8797862" y="1650198"/>
+              <a:ext cx="2566458" cy="701381"/>
             </a:xfrm>
             <a:prstGeom prst="rect">
               <a:avLst/>
@@ -6044,7 +5967,7 @@
                 <a:defRPr/>
               </a:pPr>
               <a:r>
-                <a:rPr lang="pt-PT" altLang="pt-BR" sz="1600" b="1" dirty="0">
+                <a:rPr lang="pt-PT" altLang="pt-BR" sz="1200" b="1" dirty="0">
                   <a:solidFill>
                     <a:prstClr val="white"/>
                   </a:solidFill>
@@ -6052,26 +5975,13 @@
                 <a:t>CentroEsportivo</a:t>
               </a:r>
               <a:r>
-                <a:rPr lang="pt-BR" sz="1600" b="1" dirty="0">
-                  <a:solidFill>
-                    <a:prstClr val="white"/>
-                  </a:solidFill>
-                </a:rPr>
-                <a:t> </a:t>
-              </a:r>
-              <a:r>
-                <a:rPr lang="pt-BR" sz="1600" b="1" dirty="0" err="1">
+                <a:rPr lang="pt-BR" sz="1200" b="1" dirty="0">
                   <a:solidFill>
                     <a:prstClr val="white"/>
                   </a:solidFill>
                 </a:rPr>
                 <a:t>Controller</a:t>
               </a:r>
-              <a:endParaRPr lang="pt-BR" sz="1600" b="1" dirty="0">
-                <a:solidFill>
-                  <a:prstClr val="white"/>
-                </a:solidFill>
-              </a:endParaRPr>
             </a:p>
             <a:p>
               <a:pPr lvl="0" algn="ctr">
@@ -6083,55 +5993,7 @@
                     <a:prstClr val="white"/>
                   </a:solidFill>
                 </a:rPr>
-                <a:t>[</a:t>
-              </a:r>
-              <a:r>
-                <a:rPr lang="pt-BR" sz="1200" dirty="0" err="1">
-                  <a:solidFill>
-                    <a:prstClr val="white"/>
-                  </a:solidFill>
-                </a:rPr>
-                <a:t>Component</a:t>
-              </a:r>
-              <a:r>
-                <a:rPr lang="pt-BR" sz="1200" dirty="0">
-                  <a:solidFill>
-                    <a:prstClr val="white"/>
-                  </a:solidFill>
-                </a:rPr>
-                <a:t>: </a:t>
-              </a:r>
-              <a:r>
-                <a:rPr lang="pt-BR" sz="1200" dirty="0" err="1">
-                  <a:solidFill>
-                    <a:prstClr val="white"/>
-                  </a:solidFill>
-                </a:rPr>
-                <a:t>Rest</a:t>
-              </a:r>
-              <a:r>
-                <a:rPr lang="pt-BR" sz="1200" dirty="0">
-                  <a:solidFill>
-                    <a:prstClr val="white"/>
-                  </a:solidFill>
-                </a:rPr>
-                <a:t> </a:t>
-              </a:r>
-              <a:r>
-                <a:rPr lang="pt-BR" sz="1200" dirty="0" err="1">
-                  <a:solidFill>
-                    <a:prstClr val="white"/>
-                  </a:solidFill>
-                </a:rPr>
-                <a:t>Controller</a:t>
-              </a:r>
-              <a:r>
-                <a:rPr lang="pt-BR" sz="1200" dirty="0">
-                  <a:solidFill>
-                    <a:prstClr val="white"/>
-                  </a:solidFill>
-                </a:rPr>
-                <a:t>]</a:t>
+                <a:t>[Component: Rest Controller]</a:t>
               </a:r>
             </a:p>
           </p:txBody>
@@ -6144,8 +6006,8 @@
           </p:nvSpPr>
           <p:spPr>
             <a:xfrm>
-              <a:off x="9046625" y="2904955"/>
-              <a:ext cx="2566458" cy="301102"/>
+              <a:off x="8806132" y="2489595"/>
+              <a:ext cx="2566458" cy="654622"/>
             </a:xfrm>
             <a:prstGeom prst="rect">
               <a:avLst/>
@@ -6161,21 +6023,18 @@
                 <a:defRPr/>
               </a:pPr>
               <a:r>
-                <a:rPr lang="pt-BR" sz="1200" dirty="0">
+                <a:rPr lang="pt-BR" sz="1100" dirty="0">
                   <a:solidFill>
                     <a:prstClr val="white"/>
                   </a:solidFill>
                 </a:rPr>
-                <a:t>Controle </a:t>
+                <a:t>Controle das requisições da entidade CentroEsportivo</a:t>
               </a:r>
-              <a:r>
-                <a:rPr lang="pt-PT" altLang="pt-BR" sz="1200" dirty="0">
-                  <a:solidFill>
-                    <a:prstClr val="white"/>
-                  </a:solidFill>
-                </a:rPr>
-                <a:t>do CentroEsporivo</a:t>
-              </a:r>
+              <a:endParaRPr lang="pt-PT" altLang="pt-BR" sz="1100" dirty="0">
+                <a:solidFill>
+                  <a:prstClr val="white"/>
+                </a:solidFill>
+              </a:endParaRPr>
             </a:p>
           </p:txBody>
         </p:sp>
@@ -6188,10 +6047,10 @@
         </p:nvGrpSpPr>
         <p:grpSpPr>
           <a:xfrm>
-            <a:off x="3167825" y="4252482"/>
-            <a:ext cx="2149983" cy="1311224"/>
-            <a:chOff x="8695659" y="1548927"/>
-            <a:chExt cx="2647332" cy="2016224"/>
+            <a:off x="3133278" y="4252482"/>
+            <a:ext cx="2084302" cy="1311224"/>
+            <a:chOff x="8753954" y="1548927"/>
+            <a:chExt cx="2566458" cy="2016224"/>
           </a:xfrm>
         </p:grpSpPr>
         <p:sp>
@@ -6202,7 +6061,7 @@
           </p:nvSpPr>
           <p:spPr>
             <a:xfrm>
-              <a:off x="8858634" y="1548927"/>
+              <a:off x="8868835" y="1548927"/>
               <a:ext cx="2376264" cy="2016224"/>
             </a:xfrm>
             <a:prstGeom prst="rect">
@@ -6230,7 +6089,7 @@
             <a:lstStyle/>
             <a:p>
               <a:pPr algn="ctr"/>
-              <a:endParaRPr lang="pt-BR" sz="1400">
+              <a:endParaRPr lang="pt-BR" sz="1400" dirty="0">
                 <a:solidFill>
                   <a:prstClr val="white"/>
                 </a:solidFill>
@@ -6247,8 +6106,8 @@
           </p:nvSpPr>
           <p:spPr>
             <a:xfrm>
-              <a:off x="8776533" y="1563902"/>
-              <a:ext cx="2566458" cy="846533"/>
+              <a:off x="8773118" y="1696895"/>
+              <a:ext cx="2527056" cy="709886"/>
             </a:xfrm>
             <a:prstGeom prst="rect">
               <a:avLst/>
@@ -6264,7 +6123,7 @@
                 <a:defRPr/>
               </a:pPr>
               <a:r>
-                <a:rPr lang="pt-PT" altLang="pt-BR" sz="1600" b="1" dirty="0">
+                <a:rPr lang="pt-PT" altLang="pt-BR" sz="1200" b="1" dirty="0">
                   <a:solidFill>
                     <a:prstClr val="white"/>
                   </a:solidFill>
@@ -6272,31 +6131,13 @@
                 <a:t>Locatarario</a:t>
               </a:r>
               <a:r>
-                <a:rPr lang="pt-BR" sz="1600" b="1" dirty="0">
-                  <a:solidFill>
-                    <a:prstClr val="white"/>
-                  </a:solidFill>
-                </a:rPr>
-                <a:t> </a:t>
-              </a:r>
-            </a:p>
-            <a:p>
-              <a:pPr lvl="0" algn="ctr">
-                <a:defRPr/>
-              </a:pPr>
-              <a:r>
-                <a:rPr lang="pt-BR" sz="1600" b="1" dirty="0" err="1">
+                <a:rPr lang="pt-BR" sz="1200" b="1" dirty="0">
                   <a:solidFill>
                     <a:prstClr val="white"/>
                   </a:solidFill>
                 </a:rPr>
                 <a:t>Controller</a:t>
               </a:r>
-              <a:endParaRPr lang="pt-BR" sz="1600" b="1" dirty="0">
-                <a:solidFill>
-                  <a:prstClr val="white"/>
-                </a:solidFill>
-              </a:endParaRPr>
             </a:p>
             <a:p>
               <a:pPr lvl="0" algn="ctr">
@@ -6308,39 +6149,7 @@
                     <a:prstClr val="white"/>
                   </a:solidFill>
                 </a:rPr>
-                <a:t>[</a:t>
-              </a:r>
-              <a:r>
-                <a:rPr lang="pt-BR" sz="1200" dirty="0" err="1">
-                  <a:solidFill>
-                    <a:prstClr val="white"/>
-                  </a:solidFill>
-                </a:rPr>
-                <a:t>Component:Rest</a:t>
-              </a:r>
-              <a:r>
-                <a:rPr lang="pt-BR" sz="1200" dirty="0">
-                  <a:solidFill>
-                    <a:prstClr val="white"/>
-                  </a:solidFill>
-                </a:rPr>
-                <a:t> </a:t>
-              </a:r>
-              <a:r>
-                <a:rPr lang="pt-BR" sz="1200" dirty="0" err="1">
-                  <a:solidFill>
-                    <a:prstClr val="white"/>
-                  </a:solidFill>
-                </a:rPr>
-                <a:t>Controller</a:t>
-              </a:r>
-              <a:r>
-                <a:rPr lang="pt-BR" sz="1200" dirty="0">
-                  <a:solidFill>
-                    <a:prstClr val="white"/>
-                  </a:solidFill>
-                </a:rPr>
-                <a:t>]</a:t>
+                <a:t>[Component: Rest Controller]</a:t>
               </a:r>
             </a:p>
           </p:txBody>
@@ -6353,8 +6162,8 @@
           </p:nvSpPr>
           <p:spPr>
             <a:xfrm>
-              <a:off x="8695659" y="2911702"/>
-              <a:ext cx="2566458" cy="304751"/>
+              <a:off x="8753954" y="2534800"/>
+              <a:ext cx="2566458" cy="662560"/>
             </a:xfrm>
             <a:prstGeom prst="rect">
               <a:avLst/>
@@ -6370,78 +6179,17 @@
                 <a:defRPr/>
               </a:pPr>
               <a:r>
-                <a:rPr lang="pt-BR" sz="1200" dirty="0">
+                <a:rPr lang="pt-PT" altLang="pt-BR" sz="1100" dirty="0">
                   <a:solidFill>
                     <a:prstClr val="white"/>
                   </a:solidFill>
                 </a:rPr>
-                <a:t>Controle do </a:t>
-              </a:r>
-              <a:r>
-                <a:rPr lang="pt-PT" altLang="pt-BR" sz="1200" dirty="0">
-                  <a:solidFill>
-                    <a:prstClr val="white"/>
-                  </a:solidFill>
-                </a:rPr>
-                <a:t>Locatario</a:t>
+                <a:t>Controle das requisições da entidade Locatario</a:t>
               </a:r>
             </a:p>
           </p:txBody>
         </p:sp>
       </p:grpSp>
-      <p:sp>
-        <p:nvSpPr>
-          <p:cNvPr id="43" name="Text Box 42"/>
-          <p:cNvSpPr txBox="1"/>
-          <p:nvPr/>
-        </p:nvSpPr>
-        <p:spPr>
-          <a:xfrm>
-            <a:off x="352425" y="157048"/>
-            <a:ext cx="11237595" cy="798830"/>
-          </a:xfrm>
-          <a:prstGeom prst="rect">
-            <a:avLst/>
-          </a:prstGeom>
-          <a:noFill/>
-        </p:spPr>
-        <p:txBody>
-          <a:bodyPr wrap="square" rtlCol="0">
-            <a:spAutoFit/>
-          </a:bodyPr>
-          <a:lstStyle/>
-          <a:p>
-            <a:r>
-              <a:rPr lang="pt-BR" sz="2800" dirty="0">
-                <a:solidFill>
-                  <a:srgbClr val="000000"/>
-                </a:solidFill>
-                <a:sym typeface="+mn-ea"/>
-              </a:rPr>
-              <a:t>Diagrama – Visão – Componentes – Web </a:t>
-            </a:r>
-            <a:r>
-              <a:rPr lang="pt-BR" sz="2800" dirty="0" err="1">
-                <a:solidFill>
-                  <a:srgbClr val="000000"/>
-                </a:solidFill>
-                <a:sym typeface="+mn-ea"/>
-              </a:rPr>
-              <a:t>Application</a:t>
-            </a:r>
-            <a:r>
-              <a:rPr lang="pt-BR" dirty="0">
-                <a:sym typeface="+mn-ea"/>
-              </a:rPr>
-              <a:t> </a:t>
-            </a:r>
-            <a:endParaRPr lang="pt-BR" dirty="0"/>
-          </a:p>
-          <a:p>
-            <a:endParaRPr lang="en-US" dirty="0"/>
-          </a:p>
-        </p:txBody>
-      </p:sp>
       <p:grpSp>
         <p:nvGrpSpPr>
           <p:cNvPr id="61" name="Group 38"/>
@@ -6450,10 +6198,10 @@
         </p:nvGrpSpPr>
         <p:grpSpPr>
           <a:xfrm>
-            <a:off x="10009675" y="4248847"/>
+            <a:off x="9894334" y="4248847"/>
             <a:ext cx="2134802" cy="1318493"/>
-            <a:chOff x="8754174" y="1524475"/>
-            <a:chExt cx="2647632" cy="2016224"/>
+            <a:chOff x="8712688" y="1524475"/>
+            <a:chExt cx="2647633" cy="2016224"/>
           </a:xfrm>
         </p:grpSpPr>
         <p:sp>
@@ -6492,7 +6240,7 @@
             <a:lstStyle/>
             <a:p>
               <a:pPr algn="ctr"/>
-              <a:endParaRPr lang="pt-BR" sz="1400">
+              <a:endParaRPr lang="pt-BR" sz="1400" dirty="0">
                 <a:solidFill>
                   <a:prstClr val="white"/>
                 </a:solidFill>
@@ -6509,8 +6257,8 @@
           </p:nvSpPr>
           <p:spPr>
             <a:xfrm>
-              <a:off x="8754174" y="1583057"/>
-              <a:ext cx="2647632" cy="800102"/>
+              <a:off x="8712688" y="1622323"/>
+              <a:ext cx="2647633" cy="705973"/>
             </a:xfrm>
             <a:prstGeom prst="rect">
               <a:avLst/>
@@ -6526,34 +6274,21 @@
                 <a:defRPr/>
               </a:pPr>
               <a:r>
-                <a:rPr lang="pt-PT" altLang="pt-BR" sz="1600" b="1" dirty="0">
+                <a:rPr lang="pt-PT" altLang="pt-BR" sz="1200" b="1" dirty="0">
                   <a:solidFill>
                     <a:prstClr val="white"/>
                   </a:solidFill>
                 </a:rPr>
-                <a:t>Agendamentos</a:t>
+                <a:t>Agendamento</a:t>
               </a:r>
               <a:r>
-                <a:rPr lang="pt-BR" sz="1600" b="1" dirty="0">
-                  <a:solidFill>
-                    <a:prstClr val="white"/>
-                  </a:solidFill>
-                </a:rPr>
-                <a:t> </a:t>
-              </a:r>
-              <a:r>
-                <a:rPr lang="pt-BR" sz="1600" b="1" dirty="0" err="1">
+                <a:rPr lang="pt-BR" sz="1200" b="1" dirty="0">
                   <a:solidFill>
                     <a:prstClr val="white"/>
                   </a:solidFill>
                 </a:rPr>
                 <a:t>Controller</a:t>
               </a:r>
-              <a:endParaRPr lang="pt-BR" sz="1600" b="1" dirty="0">
-                <a:solidFill>
-                  <a:prstClr val="white"/>
-                </a:solidFill>
-              </a:endParaRPr>
             </a:p>
             <a:p>
               <a:pPr lvl="0" algn="ctr">
@@ -6565,55 +6300,7 @@
                     <a:prstClr val="white"/>
                   </a:solidFill>
                 </a:rPr>
-                <a:t>[</a:t>
-              </a:r>
-              <a:r>
-                <a:rPr lang="pt-BR" sz="1200" dirty="0" err="1">
-                  <a:solidFill>
-                    <a:prstClr val="white"/>
-                  </a:solidFill>
-                </a:rPr>
-                <a:t>Component</a:t>
-              </a:r>
-              <a:r>
-                <a:rPr lang="pt-BR" sz="1200" dirty="0">
-                  <a:solidFill>
-                    <a:prstClr val="white"/>
-                  </a:solidFill>
-                </a:rPr>
-                <a:t>:  </a:t>
-              </a:r>
-              <a:r>
-                <a:rPr lang="pt-BR" sz="1200" dirty="0" err="1">
-                  <a:solidFill>
-                    <a:prstClr val="white"/>
-                  </a:solidFill>
-                </a:rPr>
-                <a:t>Rest</a:t>
-              </a:r>
-              <a:r>
-                <a:rPr lang="pt-BR" sz="1200" dirty="0">
-                  <a:solidFill>
-                    <a:prstClr val="white"/>
-                  </a:solidFill>
-                </a:rPr>
-                <a:t> </a:t>
-              </a:r>
-              <a:r>
-                <a:rPr lang="pt-BR" sz="1200" dirty="0" err="1">
-                  <a:solidFill>
-                    <a:prstClr val="white"/>
-                  </a:solidFill>
-                </a:rPr>
-                <a:t>Controller</a:t>
-              </a:r>
-              <a:r>
-                <a:rPr lang="pt-BR" sz="1200" dirty="0">
-                  <a:solidFill>
-                    <a:prstClr val="white"/>
-                  </a:solidFill>
-                </a:rPr>
-                <a:t>]</a:t>
+                <a:t>[Component:  Rest Controller]</a:t>
               </a:r>
             </a:p>
           </p:txBody>
@@ -6626,8 +6313,8 @@
           </p:nvSpPr>
           <p:spPr>
             <a:xfrm>
-              <a:off x="8810989" y="2979574"/>
-              <a:ext cx="2566458" cy="303071"/>
+              <a:off x="8753276" y="2491225"/>
+              <a:ext cx="2566458" cy="658907"/>
             </a:xfrm>
             <a:prstGeom prst="rect">
               <a:avLst/>
@@ -6643,7 +6330,7 @@
                 <a:defRPr/>
               </a:pPr>
               <a:r>
-                <a:rPr lang="pt-BR" sz="1200" dirty="0">
+                <a:rPr lang="pt-BR" sz="1100" dirty="0">
                   <a:solidFill>
                     <a:prstClr val="white"/>
                   </a:solidFill>
@@ -6651,59 +6338,22 @@
                 <a:t>Controle d</a:t>
               </a:r>
               <a:r>
-                <a:rPr lang="pt-PT" altLang="pt-BR" sz="1200" dirty="0">
+                <a:rPr lang="pt-PT" sz="1100" dirty="0">
                   <a:solidFill>
                     <a:prstClr val="white"/>
                   </a:solidFill>
                 </a:rPr>
-                <a:t>e Agendamentos</a:t>
+                <a:t>as requisições da entidade Agendamento</a:t>
               </a:r>
+              <a:endParaRPr lang="pt-PT" altLang="pt-BR" sz="1100" dirty="0">
+                <a:solidFill>
+                  <a:prstClr val="white"/>
+                </a:solidFill>
+              </a:endParaRPr>
             </a:p>
           </p:txBody>
         </p:sp>
       </p:grpSp>
-      <p:cxnSp>
-        <p:nvCxnSpPr>
-          <p:cNvPr id="4" name="Conector de Seta Reta 107"/>
-          <p:cNvCxnSpPr>
-            <a:cxnSpLocks/>
-          </p:cNvCxnSpPr>
-          <p:nvPr/>
-        </p:nvCxnSpPr>
-        <p:spPr>
-          <a:xfrm flipV="1">
-            <a:off x="7434886" y="4908094"/>
-            <a:ext cx="341309" cy="4999"/>
-          </a:xfrm>
-          <a:prstGeom prst="straightConnector1">
-            <a:avLst/>
-          </a:prstGeom>
-          <a:ln w="19050">
-            <a:solidFill>
-              <a:schemeClr val="accent5">
-                <a:lumMod val="75000"/>
-              </a:schemeClr>
-            </a:solidFill>
-            <a:prstDash val="sysDash"/>
-            <a:headEnd type="none" w="lg" len="lg"/>
-            <a:tailEnd type="triangle" w="lg" len="lg"/>
-          </a:ln>
-        </p:spPr>
-        <p:style>
-          <a:lnRef idx="1">
-            <a:schemeClr val="accent1"/>
-          </a:lnRef>
-          <a:fillRef idx="0">
-            <a:schemeClr val="accent1"/>
-          </a:fillRef>
-          <a:effectRef idx="0">
-            <a:schemeClr val="accent1"/>
-          </a:effectRef>
-          <a:fontRef idx="minor">
-            <a:schemeClr val="tx1"/>
-          </a:fontRef>
-        </p:style>
-      </p:cxnSp>
       <p:grpSp>
         <p:nvGrpSpPr>
           <p:cNvPr id="30" name="Group 38">
@@ -6718,10 +6368,10 @@
         </p:nvGrpSpPr>
         <p:grpSpPr>
           <a:xfrm>
-            <a:off x="3928548" y="1133991"/>
+            <a:off x="3729867" y="1128795"/>
             <a:ext cx="2167452" cy="1899850"/>
             <a:chOff x="8867421" y="1547039"/>
-            <a:chExt cx="2376264" cy="2016224"/>
+            <a:chExt cx="2376265" cy="2016224"/>
           </a:xfrm>
         </p:grpSpPr>
         <p:sp>
@@ -6738,7 +6388,7 @@
           </p:nvSpPr>
           <p:spPr>
             <a:xfrm>
-              <a:off x="8867421" y="1547039"/>
+              <a:off x="8867422" y="1547039"/>
               <a:ext cx="2376264" cy="2016224"/>
             </a:xfrm>
             <a:prstGeom prst="rect">
@@ -6790,7 +6440,7 @@
           <p:spPr>
             <a:xfrm>
               <a:off x="8867421" y="1715859"/>
-              <a:ext cx="2376264" cy="653258"/>
+              <a:ext cx="2376264" cy="587933"/>
             </a:xfrm>
             <a:prstGeom prst="rect">
               <a:avLst/>
@@ -6806,10 +6456,10 @@
                 <a:defRPr/>
               </a:pPr>
               <a:r>
-                <a:rPr lang="pt-BR" sz="2000" b="1" dirty="0"/>
+                <a:rPr lang="pt-BR" sz="1600" b="1" dirty="0"/>
                 <a:t>Microservice</a:t>
               </a:r>
-              <a:endParaRPr lang="pt-BR" sz="2000" b="1" dirty="0">
+              <a:endParaRPr lang="pt-BR" sz="1600" b="1" dirty="0">
                 <a:cs typeface="Calibri"/>
               </a:endParaRPr>
             </a:p>
@@ -6818,18 +6468,18 @@
                 <a:defRPr/>
               </a:pPr>
               <a:r>
+                <a:rPr lang="pt-BR" sz="1200" dirty="0"/>
+                <a:t>[</a:t>
+              </a:r>
+              <a:r>
                 <a:rPr lang="pt-BR" sz="1400" dirty="0"/>
-                <a:t>[Container: </a:t>
+                <a:t>Container: </a:t>
               </a:r>
               <a:r>
                 <a:rPr lang="pt-BR" sz="1200" dirty="0"/>
-                <a:t>Spring Boot</a:t>
+                <a:t>Spring Boot]</a:t>
               </a:r>
-              <a:r>
-                <a:rPr lang="pt-BR" sz="1400" dirty="0"/>
-                <a:t>]</a:t>
-              </a:r>
-              <a:endParaRPr lang="pt-BR" sz="1400" dirty="0">
+              <a:endParaRPr lang="pt-BR" sz="1200" dirty="0">
                 <a:cs typeface="Calibri"/>
               </a:endParaRPr>
             </a:p>
@@ -6849,8 +6499,8 @@
           </p:nvSpPr>
           <p:spPr>
             <a:xfrm>
-              <a:off x="8980917" y="2415302"/>
-              <a:ext cx="2132797" cy="881899"/>
+              <a:off x="9037739" y="2349238"/>
+              <a:ext cx="2035627" cy="816573"/>
             </a:xfrm>
             <a:prstGeom prst="rect">
               <a:avLst/>
@@ -6866,7 +6516,7 @@
                 <a:defRPr/>
               </a:pPr>
               <a:r>
-                <a:rPr lang="pt-BR" sz="1200" dirty="0"/>
+                <a:rPr lang="pt-BR" sz="1100" dirty="0"/>
                 <a:t>Aplicação para manipulação de dados de agendamentos dos locatários e seus centros esportivos</a:t>
               </a:r>
             </a:p>
@@ -6887,8 +6537,8 @@
         </p:nvSpPr>
         <p:spPr>
           <a:xfrm>
-            <a:off x="3069728" y="694481"/>
-            <a:ext cx="9027487" cy="5724312"/>
+            <a:off x="3085938" y="694481"/>
+            <a:ext cx="8929390" cy="5724312"/>
           </a:xfrm>
           <a:prstGeom prst="rect">
             <a:avLst/>
@@ -7027,102 +6677,6 @@
       </p:sp>
       <p:cxnSp>
         <p:nvCxnSpPr>
-          <p:cNvPr id="44" name="Conector de Seta Reta 107">
-            <a:extLst>
-              <a:ext uri="{FF2B5EF4-FFF2-40B4-BE49-F238E27FC236}">
-                <a16:creationId xmlns:a16="http://schemas.microsoft.com/office/drawing/2014/main" id="{E7FC574B-4054-4668-BD36-0F5D5F5C8DA9}"/>
-              </a:ext>
-            </a:extLst>
-          </p:cNvPr>
-          <p:cNvCxnSpPr>
-            <a:cxnSpLocks/>
-          </p:cNvCxnSpPr>
-          <p:nvPr/>
-        </p:nvCxnSpPr>
-        <p:spPr>
-          <a:xfrm flipV="1">
-            <a:off x="9724974" y="4865344"/>
-            <a:ext cx="341309" cy="4999"/>
-          </a:xfrm>
-          <a:prstGeom prst="straightConnector1">
-            <a:avLst/>
-          </a:prstGeom>
-          <a:ln w="19050">
-            <a:solidFill>
-              <a:schemeClr val="accent5">
-                <a:lumMod val="75000"/>
-              </a:schemeClr>
-            </a:solidFill>
-            <a:prstDash val="sysDash"/>
-            <a:headEnd type="none" w="lg" len="lg"/>
-            <a:tailEnd type="triangle" w="lg" len="lg"/>
-          </a:ln>
-        </p:spPr>
-        <p:style>
-          <a:lnRef idx="1">
-            <a:schemeClr val="accent1"/>
-          </a:lnRef>
-          <a:fillRef idx="0">
-            <a:schemeClr val="accent1"/>
-          </a:fillRef>
-          <a:effectRef idx="0">
-            <a:schemeClr val="accent1"/>
-          </a:effectRef>
-          <a:fontRef idx="minor">
-            <a:schemeClr val="tx1"/>
-          </a:fontRef>
-        </p:style>
-      </p:cxnSp>
-      <p:cxnSp>
-        <p:nvCxnSpPr>
-          <p:cNvPr id="45" name="Conector de Seta Reta 107">
-            <a:extLst>
-              <a:ext uri="{FF2B5EF4-FFF2-40B4-BE49-F238E27FC236}">
-                <a16:creationId xmlns:a16="http://schemas.microsoft.com/office/drawing/2014/main" id="{87535F3B-349D-42F5-BF03-C7F0E26B0E6F}"/>
-              </a:ext>
-            </a:extLst>
-          </p:cNvPr>
-          <p:cNvCxnSpPr>
-            <a:cxnSpLocks/>
-          </p:cNvCxnSpPr>
-          <p:nvPr/>
-        </p:nvCxnSpPr>
-        <p:spPr>
-          <a:xfrm flipV="1">
-            <a:off x="5238303" y="4851924"/>
-            <a:ext cx="341309" cy="4999"/>
-          </a:xfrm>
-          <a:prstGeom prst="straightConnector1">
-            <a:avLst/>
-          </a:prstGeom>
-          <a:ln w="19050">
-            <a:solidFill>
-              <a:schemeClr val="accent5">
-                <a:lumMod val="75000"/>
-              </a:schemeClr>
-            </a:solidFill>
-            <a:prstDash val="sysDash"/>
-            <a:headEnd type="none" w="lg" len="lg"/>
-            <a:tailEnd type="triangle" w="lg" len="lg"/>
-          </a:ln>
-        </p:spPr>
-        <p:style>
-          <a:lnRef idx="1">
-            <a:schemeClr val="accent1"/>
-          </a:lnRef>
-          <a:fillRef idx="0">
-            <a:schemeClr val="accent1"/>
-          </a:fillRef>
-          <a:effectRef idx="0">
-            <a:schemeClr val="accent1"/>
-          </a:effectRef>
-          <a:fontRef idx="minor">
-            <a:schemeClr val="tx1"/>
-          </a:fontRef>
-        </p:style>
-      </p:cxnSp>
-      <p:cxnSp>
-        <p:nvCxnSpPr>
           <p:cNvPr id="46" name="Conector de Seta Reta 107">
             <a:extLst>
               <a:ext uri="{FF2B5EF4-FFF2-40B4-BE49-F238E27FC236}">
@@ -7132,13 +6686,15 @@
           </p:cNvPr>
           <p:cNvCxnSpPr>
             <a:cxnSpLocks/>
+            <a:stCxn id="31" idx="1"/>
+            <a:endCxn id="14" idx="4"/>
           </p:cNvCxnSpPr>
           <p:nvPr/>
         </p:nvCxnSpPr>
         <p:spPr>
-          <a:xfrm flipH="1">
-            <a:off x="2782169" y="1909676"/>
-            <a:ext cx="1146379" cy="0"/>
+          <a:xfrm flipH="1" flipV="1">
+            <a:off x="2658678" y="2077321"/>
+            <a:ext cx="1071192" cy="1399"/>
           </a:xfrm>
           <a:prstGeom prst="straightConnector1">
             <a:avLst/>
@@ -7180,13 +6736,15 @@
           </p:cNvPr>
           <p:cNvCxnSpPr>
             <a:cxnSpLocks/>
+            <a:stCxn id="18" idx="1"/>
+            <a:endCxn id="31" idx="3"/>
           </p:cNvCxnSpPr>
           <p:nvPr/>
         </p:nvCxnSpPr>
         <p:spPr>
           <a:xfrm flipH="1">
-            <a:off x="6096000" y="1953921"/>
-            <a:ext cx="1146379" cy="0"/>
+            <a:off x="5897322" y="2078443"/>
+            <a:ext cx="597750" cy="277"/>
           </a:xfrm>
           <a:prstGeom prst="straightConnector1">
             <a:avLst/>
@@ -7219,36 +6777,29 @@
       </p:cxnSp>
       <p:cxnSp>
         <p:nvCxnSpPr>
-          <p:cNvPr id="50" name="Conector de Seta Reta 107">
+          <p:cNvPr id="8" name="Conector reto 7">
             <a:extLst>
               <a:ext uri="{FF2B5EF4-FFF2-40B4-BE49-F238E27FC236}">
-                <a16:creationId xmlns:a16="http://schemas.microsoft.com/office/drawing/2014/main" id="{63073F6E-D5CE-4D81-8266-2203C56170FF}"/>
+                <a16:creationId xmlns:a16="http://schemas.microsoft.com/office/drawing/2014/main" id="{1A84A5C4-1ABC-4066-9FF7-2168D5C1DD1D}"/>
               </a:ext>
             </a:extLst>
           </p:cNvPr>
           <p:cNvCxnSpPr>
             <a:cxnSpLocks/>
-            <a:stCxn id="24" idx="0"/>
+            <a:stCxn id="23" idx="0"/>
           </p:cNvCxnSpPr>
           <p:nvPr/>
         </p:nvCxnSpPr>
         <p:spPr>
           <a:xfrm flipV="1">
-            <a:off x="4275657" y="2841221"/>
-            <a:ext cx="3307814" cy="1421000"/>
+            <a:off x="4191497" y="3653824"/>
+            <a:ext cx="3" cy="598658"/>
           </a:xfrm>
-          <a:prstGeom prst="straightConnector1">
+          <a:prstGeom prst="line">
             <a:avLst/>
           </a:prstGeom>
           <a:ln w="19050">
-            <a:solidFill>
-              <a:schemeClr val="accent5">
-                <a:lumMod val="75000"/>
-              </a:schemeClr>
-            </a:solidFill>
             <a:prstDash val="sysDash"/>
-            <a:headEnd type="none" w="lg" len="lg"/>
-            <a:tailEnd type="triangle" w="lg" len="lg"/>
           </a:ln>
         </p:spPr>
         <p:style>
@@ -7268,10 +6819,10 @@
       </p:cxnSp>
       <p:cxnSp>
         <p:nvCxnSpPr>
-          <p:cNvPr id="53" name="Conector de Seta Reta 107">
+          <p:cNvPr id="47" name="Conector reto 46">
             <a:extLst>
               <a:ext uri="{FF2B5EF4-FFF2-40B4-BE49-F238E27FC236}">
-                <a16:creationId xmlns:a16="http://schemas.microsoft.com/office/drawing/2014/main" id="{913386FE-4D3A-4B8B-A952-30730044FB3E}"/>
+                <a16:creationId xmlns:a16="http://schemas.microsoft.com/office/drawing/2014/main" id="{0473CC43-5297-403B-8864-36DB699955F5}"/>
               </a:ext>
             </a:extLst>
           </p:cNvPr>
@@ -7283,21 +6834,14 @@
         </p:nvCxnSpPr>
         <p:spPr>
           <a:xfrm flipV="1">
-            <a:off x="6495780" y="2841221"/>
-            <a:ext cx="1374117" cy="1389766"/>
+            <a:off x="6413893" y="3645975"/>
+            <a:ext cx="0" cy="585012"/>
           </a:xfrm>
-          <a:prstGeom prst="straightConnector1">
+          <a:prstGeom prst="line">
             <a:avLst/>
           </a:prstGeom>
           <a:ln w="19050">
-            <a:solidFill>
-              <a:schemeClr val="accent5">
-                <a:lumMod val="75000"/>
-              </a:schemeClr>
-            </a:solidFill>
             <a:prstDash val="sysDash"/>
-            <a:headEnd type="none" w="lg" len="lg"/>
-            <a:tailEnd type="triangle" w="lg" len="lg"/>
           </a:ln>
         </p:spPr>
         <p:style>
@@ -7317,37 +6861,29 @@
       </p:cxnSp>
       <p:cxnSp>
         <p:nvCxnSpPr>
-          <p:cNvPr id="57" name="Conector de Seta Reta 107">
+          <p:cNvPr id="51" name="Conector reto 50">
             <a:extLst>
               <a:ext uri="{FF2B5EF4-FFF2-40B4-BE49-F238E27FC236}">
-                <a16:creationId xmlns:a16="http://schemas.microsoft.com/office/drawing/2014/main" id="{0F1C0A30-727E-4B9B-95AD-0BE2B401EC6C}"/>
+                <a16:creationId xmlns:a16="http://schemas.microsoft.com/office/drawing/2014/main" id="{5164F04D-B418-4018-8C6F-56713638CF9C}"/>
               </a:ext>
             </a:extLst>
           </p:cNvPr>
           <p:cNvCxnSpPr>
             <a:cxnSpLocks/>
-            <a:stCxn id="120" idx="0"/>
-            <a:endCxn id="18" idx="2"/>
+            <a:stCxn id="119" idx="0"/>
           </p:cNvCxnSpPr>
           <p:nvPr/>
         </p:nvCxnSpPr>
         <p:spPr>
-          <a:xfrm flipH="1" flipV="1">
-            <a:off x="8477565" y="2841221"/>
-            <a:ext cx="290218" cy="1442427"/>
+          <a:xfrm flipV="1">
+            <a:off x="8652792" y="3645975"/>
+            <a:ext cx="0" cy="606507"/>
           </a:xfrm>
-          <a:prstGeom prst="straightConnector1">
+          <a:prstGeom prst="line">
             <a:avLst/>
           </a:prstGeom>
           <a:ln w="19050">
-            <a:solidFill>
-              <a:schemeClr val="accent5">
-                <a:lumMod val="75000"/>
-              </a:schemeClr>
-            </a:solidFill>
             <a:prstDash val="sysDash"/>
-            <a:headEnd type="none" w="lg" len="lg"/>
-            <a:tailEnd type="triangle" w="lg" len="lg"/>
           </a:ln>
         </p:spPr>
         <p:style>
@@ -7367,23 +6903,106 @@
       </p:cxnSp>
       <p:cxnSp>
         <p:nvCxnSpPr>
-          <p:cNvPr id="59" name="Conector de Seta Reta 107">
+          <p:cNvPr id="54" name="Conector reto 53">
             <a:extLst>
               <a:ext uri="{FF2B5EF4-FFF2-40B4-BE49-F238E27FC236}">
-                <a16:creationId xmlns:a16="http://schemas.microsoft.com/office/drawing/2014/main" id="{6F2B98A3-63B0-4BEB-A055-9C3C3642B4B7}"/>
+                <a16:creationId xmlns:a16="http://schemas.microsoft.com/office/drawing/2014/main" id="{1A65B6B0-2982-4353-9231-2AAF78A09C79}"/>
               </a:ext>
             </a:extLst>
           </p:cNvPr>
           <p:cNvCxnSpPr>
             <a:cxnSpLocks/>
-            <a:stCxn id="64" idx="0"/>
+            <a:stCxn id="63" idx="0"/>
           </p:cNvCxnSpPr>
           <p:nvPr/>
         </p:nvCxnSpPr>
         <p:spPr>
-          <a:xfrm flipH="1" flipV="1">
-            <a:off x="9005408" y="2818808"/>
-            <a:ext cx="2071668" cy="1468348"/>
+          <a:xfrm flipV="1">
+            <a:off x="10951476" y="3653824"/>
+            <a:ext cx="0" cy="595023"/>
+          </a:xfrm>
+          <a:prstGeom prst="line">
+            <a:avLst/>
+          </a:prstGeom>
+          <a:ln w="19050">
+            <a:prstDash val="sysDash"/>
+          </a:ln>
+        </p:spPr>
+        <p:style>
+          <a:lnRef idx="1">
+            <a:schemeClr val="accent1"/>
+          </a:lnRef>
+          <a:fillRef idx="0">
+            <a:schemeClr val="accent1"/>
+          </a:fillRef>
+          <a:effectRef idx="0">
+            <a:schemeClr val="accent1"/>
+          </a:effectRef>
+          <a:fontRef idx="minor">
+            <a:schemeClr val="tx1"/>
+          </a:fontRef>
+        </p:style>
+      </p:cxnSp>
+      <p:cxnSp>
+        <p:nvCxnSpPr>
+          <p:cNvPr id="56" name="Conector reto 55">
+            <a:extLst>
+              <a:ext uri="{FF2B5EF4-FFF2-40B4-BE49-F238E27FC236}">
+                <a16:creationId xmlns:a16="http://schemas.microsoft.com/office/drawing/2014/main" id="{CFF97977-CFB8-4597-9EF3-64CB1E8F1707}"/>
+              </a:ext>
+            </a:extLst>
+          </p:cNvPr>
+          <p:cNvCxnSpPr>
+            <a:cxnSpLocks/>
+          </p:cNvCxnSpPr>
+          <p:nvPr/>
+        </p:nvCxnSpPr>
+        <p:spPr>
+          <a:xfrm flipH="1">
+            <a:off x="4183215" y="3645975"/>
+            <a:ext cx="6768261" cy="0"/>
+          </a:xfrm>
+          <a:prstGeom prst="line">
+            <a:avLst/>
+          </a:prstGeom>
+          <a:ln w="19050">
+            <a:prstDash val="sysDash"/>
+          </a:ln>
+        </p:spPr>
+        <p:style>
+          <a:lnRef idx="1">
+            <a:schemeClr val="accent1"/>
+          </a:lnRef>
+          <a:fillRef idx="0">
+            <a:schemeClr val="accent1"/>
+          </a:fillRef>
+          <a:effectRef idx="0">
+            <a:schemeClr val="accent1"/>
+          </a:effectRef>
+          <a:fontRef idx="minor">
+            <a:schemeClr val="tx1"/>
+          </a:fontRef>
+        </p:style>
+      </p:cxnSp>
+      <p:cxnSp>
+        <p:nvCxnSpPr>
+          <p:cNvPr id="85" name="Conector de Seta Reta 107">
+            <a:extLst>
+              <a:ext uri="{FF2B5EF4-FFF2-40B4-BE49-F238E27FC236}">
+                <a16:creationId xmlns:a16="http://schemas.microsoft.com/office/drawing/2014/main" id="{FEB0ADF2-7669-4299-BD2C-0CD36E65C582}"/>
+              </a:ext>
+            </a:extLst>
+          </p:cNvPr>
+          <p:cNvCxnSpPr>
+            <a:cxnSpLocks/>
+            <a:endCxn id="18" idx="2"/>
+          </p:cNvCxnSpPr>
+          <p:nvPr/>
+        </p:nvCxnSpPr>
+        <p:spPr>
+          <a:xfrm flipV="1">
+            <a:off x="7694308" y="2866809"/>
+            <a:ext cx="4659" cy="787015"/>
           </a:xfrm>
           <a:prstGeom prst="straightConnector1">
             <a:avLst/>
@@ -7705,7 +7324,7 @@
                                           </p:stCondLst>
                                         </p:cTn>
                                         <p:tgtEl>
-                                          <p:spTgt spid="4"/>
+                                          <p:spTgt spid="30"/>
                                         </p:tgtEl>
                                         <p:attrNameLst>
                                           <p:attrName>style.visibility</p:attrName>
@@ -7750,7 +7369,7 @@
                                           </p:stCondLst>
                                         </p:cTn>
                                         <p:tgtEl>
-                                          <p:spTgt spid="30"/>
+                                          <p:spTgt spid="46"/>
                                         </p:tgtEl>
                                         <p:attrNameLst>
                                           <p:attrName>style.visibility</p:attrName>
@@ -7795,7 +7414,7 @@
                                           </p:stCondLst>
                                         </p:cTn>
                                         <p:tgtEl>
-                                          <p:spTgt spid="44"/>
+                                          <p:spTgt spid="49"/>
                                         </p:tgtEl>
                                         <p:attrNameLst>
                                           <p:attrName>style.visibility</p:attrName>
@@ -7840,277 +7459,7 @@
                                           </p:stCondLst>
                                         </p:cTn>
                                         <p:tgtEl>
-                                          <p:spTgt spid="45"/>
-                                        </p:tgtEl>
-                                        <p:attrNameLst>
-                                          <p:attrName>style.visibility</p:attrName>
-                                        </p:attrNameLst>
-                                      </p:cBhvr>
-                                      <p:to>
-                                        <p:strVal val="visible"/>
-                                      </p:to>
-                                    </p:set>
-                                  </p:childTnLst>
-                                </p:cTn>
-                              </p:par>
-                            </p:childTnLst>
-                          </p:cTn>
-                        </p:par>
-                      </p:childTnLst>
-                    </p:cTn>
-                  </p:par>
-                  <p:par>
-                    <p:cTn id="41" fill="hold">
-                      <p:stCondLst>
-                        <p:cond delay="indefinite"/>
-                      </p:stCondLst>
-                      <p:childTnLst>
-                        <p:par>
-                          <p:cTn id="42" fill="hold">
-                            <p:stCondLst>
-                              <p:cond delay="0"/>
-                            </p:stCondLst>
-                            <p:childTnLst>
-                              <p:par>
-                                <p:cTn id="43" presetID="1" presetClass="entr" presetSubtype="0" fill="hold" nodeType="clickEffect">
-                                  <p:stCondLst>
-                                    <p:cond delay="0"/>
-                                  </p:stCondLst>
-                                  <p:childTnLst>
-                                    <p:set>
-                                      <p:cBhvr>
-                                        <p:cTn id="44" dur="1" fill="hold">
-                                          <p:stCondLst>
-                                            <p:cond delay="0"/>
-                                          </p:stCondLst>
-                                        </p:cTn>
-                                        <p:tgtEl>
-                                          <p:spTgt spid="46"/>
-                                        </p:tgtEl>
-                                        <p:attrNameLst>
-                                          <p:attrName>style.visibility</p:attrName>
-                                        </p:attrNameLst>
-                                      </p:cBhvr>
-                                      <p:to>
-                                        <p:strVal val="visible"/>
-                                      </p:to>
-                                    </p:set>
-                                  </p:childTnLst>
-                                </p:cTn>
-                              </p:par>
-                            </p:childTnLst>
-                          </p:cTn>
-                        </p:par>
-                      </p:childTnLst>
-                    </p:cTn>
-                  </p:par>
-                  <p:par>
-                    <p:cTn id="45" fill="hold">
-                      <p:stCondLst>
-                        <p:cond delay="indefinite"/>
-                      </p:stCondLst>
-                      <p:childTnLst>
-                        <p:par>
-                          <p:cTn id="46" fill="hold">
-                            <p:stCondLst>
-                              <p:cond delay="0"/>
-                            </p:stCondLst>
-                            <p:childTnLst>
-                              <p:par>
-                                <p:cTn id="47" presetID="1" presetClass="entr" presetSubtype="0" fill="hold" nodeType="clickEffect">
-                                  <p:stCondLst>
-                                    <p:cond delay="0"/>
-                                  </p:stCondLst>
-                                  <p:childTnLst>
-                                    <p:set>
-                                      <p:cBhvr>
-                                        <p:cTn id="48" dur="1" fill="hold">
-                                          <p:stCondLst>
-                                            <p:cond delay="0"/>
-                                          </p:stCondLst>
-                                        </p:cTn>
-                                        <p:tgtEl>
-                                          <p:spTgt spid="49"/>
-                                        </p:tgtEl>
-                                        <p:attrNameLst>
-                                          <p:attrName>style.visibility</p:attrName>
-                                        </p:attrNameLst>
-                                      </p:cBhvr>
-                                      <p:to>
-                                        <p:strVal val="visible"/>
-                                      </p:to>
-                                    </p:set>
-                                  </p:childTnLst>
-                                </p:cTn>
-                              </p:par>
-                            </p:childTnLst>
-                          </p:cTn>
-                        </p:par>
-                      </p:childTnLst>
-                    </p:cTn>
-                  </p:par>
-                  <p:par>
-                    <p:cTn id="49" fill="hold">
-                      <p:stCondLst>
-                        <p:cond delay="indefinite"/>
-                      </p:stCondLst>
-                      <p:childTnLst>
-                        <p:par>
-                          <p:cTn id="50" fill="hold">
-                            <p:stCondLst>
-                              <p:cond delay="0"/>
-                            </p:stCondLst>
-                            <p:childTnLst>
-                              <p:par>
-                                <p:cTn id="51" presetID="1" presetClass="entr" presetSubtype="0" fill="hold" nodeType="clickEffect">
-                                  <p:stCondLst>
-                                    <p:cond delay="0"/>
-                                  </p:stCondLst>
-                                  <p:childTnLst>
-                                    <p:set>
-                                      <p:cBhvr>
-                                        <p:cTn id="52" dur="1" fill="hold">
-                                          <p:stCondLst>
-                                            <p:cond delay="0"/>
-                                          </p:stCondLst>
-                                        </p:cTn>
-                                        <p:tgtEl>
-                                          <p:spTgt spid="50"/>
-                                        </p:tgtEl>
-                                        <p:attrNameLst>
-                                          <p:attrName>style.visibility</p:attrName>
-                                        </p:attrNameLst>
-                                      </p:cBhvr>
-                                      <p:to>
-                                        <p:strVal val="visible"/>
-                                      </p:to>
-                                    </p:set>
-                                  </p:childTnLst>
-                                </p:cTn>
-                              </p:par>
-                            </p:childTnLst>
-                          </p:cTn>
-                        </p:par>
-                      </p:childTnLst>
-                    </p:cTn>
-                  </p:par>
-                  <p:par>
-                    <p:cTn id="53" fill="hold">
-                      <p:stCondLst>
-                        <p:cond delay="indefinite"/>
-                      </p:stCondLst>
-                      <p:childTnLst>
-                        <p:par>
-                          <p:cTn id="54" fill="hold">
-                            <p:stCondLst>
-                              <p:cond delay="0"/>
-                            </p:stCondLst>
-                            <p:childTnLst>
-                              <p:par>
-                                <p:cTn id="55" presetID="1" presetClass="entr" presetSubtype="0" fill="hold" nodeType="clickEffect">
-                                  <p:stCondLst>
-                                    <p:cond delay="0"/>
-                                  </p:stCondLst>
-                                  <p:childTnLst>
-                                    <p:set>
-                                      <p:cBhvr>
-                                        <p:cTn id="56" dur="1" fill="hold">
-                                          <p:stCondLst>
-                                            <p:cond delay="0"/>
-                                          </p:stCondLst>
-                                        </p:cTn>
-                                        <p:tgtEl>
-                                          <p:spTgt spid="53"/>
-                                        </p:tgtEl>
-                                        <p:attrNameLst>
-                                          <p:attrName>style.visibility</p:attrName>
-                                        </p:attrNameLst>
-                                      </p:cBhvr>
-                                      <p:to>
-                                        <p:strVal val="visible"/>
-                                      </p:to>
-                                    </p:set>
-                                  </p:childTnLst>
-                                </p:cTn>
-                              </p:par>
-                            </p:childTnLst>
-                          </p:cTn>
-                        </p:par>
-                      </p:childTnLst>
-                    </p:cTn>
-                  </p:par>
-                  <p:par>
-                    <p:cTn id="57" fill="hold">
-                      <p:stCondLst>
-                        <p:cond delay="indefinite"/>
-                      </p:stCondLst>
-                      <p:childTnLst>
-                        <p:par>
-                          <p:cTn id="58" fill="hold">
-                            <p:stCondLst>
-                              <p:cond delay="0"/>
-                            </p:stCondLst>
-                            <p:childTnLst>
-                              <p:par>
-                                <p:cTn id="59" presetID="1" presetClass="entr" presetSubtype="0" fill="hold" nodeType="clickEffect">
-                                  <p:stCondLst>
-                                    <p:cond delay="0"/>
-                                  </p:stCondLst>
-                                  <p:childTnLst>
-                                    <p:set>
-                                      <p:cBhvr>
-                                        <p:cTn id="60" dur="1" fill="hold">
-                                          <p:stCondLst>
-                                            <p:cond delay="0"/>
-                                          </p:stCondLst>
-                                        </p:cTn>
-                                        <p:tgtEl>
-                                          <p:spTgt spid="57"/>
-                                        </p:tgtEl>
-                                        <p:attrNameLst>
-                                          <p:attrName>style.visibility</p:attrName>
-                                        </p:attrNameLst>
-                                      </p:cBhvr>
-                                      <p:to>
-                                        <p:strVal val="visible"/>
-                                      </p:to>
-                                    </p:set>
-                                  </p:childTnLst>
-                                </p:cTn>
-                              </p:par>
-                            </p:childTnLst>
-                          </p:cTn>
-                        </p:par>
-                      </p:childTnLst>
-                    </p:cTn>
-                  </p:par>
-                  <p:par>
-                    <p:cTn id="61" fill="hold">
-                      <p:stCondLst>
-                        <p:cond delay="indefinite"/>
-                      </p:stCondLst>
-                      <p:childTnLst>
-                        <p:par>
-                          <p:cTn id="62" fill="hold">
-                            <p:stCondLst>
-                              <p:cond delay="0"/>
-                            </p:stCondLst>
-                            <p:childTnLst>
-                              <p:par>
-                                <p:cTn id="63" presetID="1" presetClass="entr" presetSubtype="0" fill="hold" nodeType="clickEffect">
-                                  <p:stCondLst>
-                                    <p:cond delay="0"/>
-                                  </p:stCondLst>
-                                  <p:childTnLst>
-                                    <p:set>
-                                      <p:cBhvr>
-                                        <p:cTn id="64" dur="1" fill="hold">
-                                          <p:stCondLst>
-                                            <p:cond delay="0"/>
-                                          </p:stCondLst>
-                                        </p:cTn>
-                                        <p:tgtEl>
-                                          <p:spTgt spid="59"/>
+                                          <p:spTgt spid="85"/>
                                         </p:tgtEl>
                                         <p:attrNameLst>
                                           <p:attrName>style.visibility</p:attrName>

</xml_diff>

<commit_message>
Alteração ppt com componentes
</commit_message>
<xml_diff>
--- a/documentacao/desenho-de-solução/Solucao_do_Projeto_com_Containers_componentes.pptx
+++ b/documentacao/desenho-de-solução/Solucao_do_Projeto_com_Containers_componentes.pptx
@@ -244,7 +244,7 @@
           <a:p>
             <a:fld id="{C0C7093E-3454-4D60-86CF-1DF1D2C66BEB}" type="datetimeFigureOut">
               <a:rPr lang="pt-BR" smtClean="0"/>
-              <a:t>27/11/2021</a:t>
+              <a:t>29/11/2021</a:t>
             </a:fld>
             <a:endParaRPr lang="pt-BR"/>
           </a:p>
@@ -409,7 +409,7 @@
           <a:p>
             <a:fld id="{C0C7093E-3454-4D60-86CF-1DF1D2C66BEB}" type="datetimeFigureOut">
               <a:rPr lang="pt-BR" smtClean="0"/>
-              <a:t>27/11/2021</a:t>
+              <a:t>29/11/2021</a:t>
             </a:fld>
             <a:endParaRPr lang="pt-BR"/>
           </a:p>
@@ -584,7 +584,7 @@
           <a:p>
             <a:fld id="{C0C7093E-3454-4D60-86CF-1DF1D2C66BEB}" type="datetimeFigureOut">
               <a:rPr lang="pt-BR" smtClean="0"/>
-              <a:t>27/11/2021</a:t>
+              <a:t>29/11/2021</a:t>
             </a:fld>
             <a:endParaRPr lang="pt-BR"/>
           </a:p>
@@ -749,7 +749,7 @@
           <a:p>
             <a:fld id="{C0C7093E-3454-4D60-86CF-1DF1D2C66BEB}" type="datetimeFigureOut">
               <a:rPr lang="pt-BR" smtClean="0"/>
-              <a:t>27/11/2021</a:t>
+              <a:t>29/11/2021</a:t>
             </a:fld>
             <a:endParaRPr lang="pt-BR"/>
           </a:p>
@@ -990,7 +990,7 @@
           <a:p>
             <a:fld id="{C0C7093E-3454-4D60-86CF-1DF1D2C66BEB}" type="datetimeFigureOut">
               <a:rPr lang="pt-BR" smtClean="0"/>
-              <a:t>27/11/2021</a:t>
+              <a:t>29/11/2021</a:t>
             </a:fld>
             <a:endParaRPr lang="pt-BR"/>
           </a:p>
@@ -1217,7 +1217,7 @@
           <a:p>
             <a:fld id="{C0C7093E-3454-4D60-86CF-1DF1D2C66BEB}" type="datetimeFigureOut">
               <a:rPr lang="pt-BR" smtClean="0"/>
-              <a:t>27/11/2021</a:t>
+              <a:t>29/11/2021</a:t>
             </a:fld>
             <a:endParaRPr lang="pt-BR"/>
           </a:p>
@@ -1579,7 +1579,7 @@
           <a:p>
             <a:fld id="{C0C7093E-3454-4D60-86CF-1DF1D2C66BEB}" type="datetimeFigureOut">
               <a:rPr lang="pt-BR" smtClean="0"/>
-              <a:t>27/11/2021</a:t>
+              <a:t>29/11/2021</a:t>
             </a:fld>
             <a:endParaRPr lang="pt-BR"/>
           </a:p>
@@ -1692,7 +1692,7 @@
           <a:p>
             <a:fld id="{C0C7093E-3454-4D60-86CF-1DF1D2C66BEB}" type="datetimeFigureOut">
               <a:rPr lang="pt-BR" smtClean="0"/>
-              <a:t>27/11/2021</a:t>
+              <a:t>29/11/2021</a:t>
             </a:fld>
             <a:endParaRPr lang="pt-BR"/>
           </a:p>
@@ -1782,7 +1782,7 @@
           <a:p>
             <a:fld id="{C0C7093E-3454-4D60-86CF-1DF1D2C66BEB}" type="datetimeFigureOut">
               <a:rPr lang="pt-BR" smtClean="0"/>
-              <a:t>27/11/2021</a:t>
+              <a:t>29/11/2021</a:t>
             </a:fld>
             <a:endParaRPr lang="pt-BR"/>
           </a:p>
@@ -2054,7 +2054,7 @@
           <a:p>
             <a:fld id="{C0C7093E-3454-4D60-86CF-1DF1D2C66BEB}" type="datetimeFigureOut">
               <a:rPr lang="pt-BR" smtClean="0"/>
-              <a:t>27/11/2021</a:t>
+              <a:t>29/11/2021</a:t>
             </a:fld>
             <a:endParaRPr lang="pt-BR"/>
           </a:p>
@@ -2306,7 +2306,7 @@
           <a:p>
             <a:fld id="{C0C7093E-3454-4D60-86CF-1DF1D2C66BEB}" type="datetimeFigureOut">
               <a:rPr lang="pt-BR" smtClean="0"/>
-              <a:t>27/11/2021</a:t>
+              <a:t>29/11/2021</a:t>
             </a:fld>
             <a:endParaRPr lang="pt-BR"/>
           </a:p>
@@ -2366,9 +2366,12 @@
 <p:sldMaster xmlns:a="http://schemas.openxmlformats.org/drawingml/2006/main" xmlns:r="http://schemas.openxmlformats.org/officeDocument/2006/relationships" xmlns:p="http://schemas.openxmlformats.org/presentationml/2006/main">
   <p:cSld>
     <p:bg>
-      <p:bgRef idx="1001">
-        <a:schemeClr val="bg1"/>
-      </p:bgRef>
+      <p:bgPr>
+        <a:solidFill>
+          <a:srgbClr val="1B2024"/>
+        </a:solidFill>
+        <a:effectLst/>
+      </p:bgPr>
     </p:bg>
     <p:spTree>
       <p:nvGrpSpPr>
@@ -2514,7 +2517,7 @@
           <a:p>
             <a:fld id="{C0C7093E-3454-4D60-86CF-1DF1D2C66BEB}" type="datetimeFigureOut">
               <a:rPr lang="pt-BR" smtClean="0"/>
-              <a:t>27/11/2021</a:t>
+              <a:t>29/11/2021</a:t>
             </a:fld>
             <a:endParaRPr lang="pt-BR"/>
           </a:p>

</xml_diff>

<commit_message>
[Feat.] Adiciona lógica de recuperação da quadra + desenho de solução com containers
</commit_message>
<xml_diff>
--- a/documentacao/desenho-de-solução/Solucao_do_Projeto_com_Containers_componentes.pptx
+++ b/documentacao/desenho-de-solução/Solucao_do_Projeto_com_Containers_componentes.pptx
@@ -244,7 +244,7 @@
           <a:p>
             <a:fld id="{C0C7093E-3454-4D60-86CF-1DF1D2C66BEB}" type="datetimeFigureOut">
               <a:rPr lang="pt-BR" smtClean="0"/>
-              <a:t>29/11/2021</a:t>
+              <a:t>30/11/2021</a:t>
             </a:fld>
             <a:endParaRPr lang="pt-BR"/>
           </a:p>
@@ -409,7 +409,7 @@
           <a:p>
             <a:fld id="{C0C7093E-3454-4D60-86CF-1DF1D2C66BEB}" type="datetimeFigureOut">
               <a:rPr lang="pt-BR" smtClean="0"/>
-              <a:t>29/11/2021</a:t>
+              <a:t>30/11/2021</a:t>
             </a:fld>
             <a:endParaRPr lang="pt-BR"/>
           </a:p>
@@ -584,7 +584,7 @@
           <a:p>
             <a:fld id="{C0C7093E-3454-4D60-86CF-1DF1D2C66BEB}" type="datetimeFigureOut">
               <a:rPr lang="pt-BR" smtClean="0"/>
-              <a:t>29/11/2021</a:t>
+              <a:t>30/11/2021</a:t>
             </a:fld>
             <a:endParaRPr lang="pt-BR"/>
           </a:p>
@@ -749,7 +749,7 @@
           <a:p>
             <a:fld id="{C0C7093E-3454-4D60-86CF-1DF1D2C66BEB}" type="datetimeFigureOut">
               <a:rPr lang="pt-BR" smtClean="0"/>
-              <a:t>29/11/2021</a:t>
+              <a:t>30/11/2021</a:t>
             </a:fld>
             <a:endParaRPr lang="pt-BR"/>
           </a:p>
@@ -990,7 +990,7 @@
           <a:p>
             <a:fld id="{C0C7093E-3454-4D60-86CF-1DF1D2C66BEB}" type="datetimeFigureOut">
               <a:rPr lang="pt-BR" smtClean="0"/>
-              <a:t>29/11/2021</a:t>
+              <a:t>30/11/2021</a:t>
             </a:fld>
             <a:endParaRPr lang="pt-BR"/>
           </a:p>
@@ -1217,7 +1217,7 @@
           <a:p>
             <a:fld id="{C0C7093E-3454-4D60-86CF-1DF1D2C66BEB}" type="datetimeFigureOut">
               <a:rPr lang="pt-BR" smtClean="0"/>
-              <a:t>29/11/2021</a:t>
+              <a:t>30/11/2021</a:t>
             </a:fld>
             <a:endParaRPr lang="pt-BR"/>
           </a:p>
@@ -1579,7 +1579,7 @@
           <a:p>
             <a:fld id="{C0C7093E-3454-4D60-86CF-1DF1D2C66BEB}" type="datetimeFigureOut">
               <a:rPr lang="pt-BR" smtClean="0"/>
-              <a:t>29/11/2021</a:t>
+              <a:t>30/11/2021</a:t>
             </a:fld>
             <a:endParaRPr lang="pt-BR"/>
           </a:p>
@@ -1692,7 +1692,7 @@
           <a:p>
             <a:fld id="{C0C7093E-3454-4D60-86CF-1DF1D2C66BEB}" type="datetimeFigureOut">
               <a:rPr lang="pt-BR" smtClean="0"/>
-              <a:t>29/11/2021</a:t>
+              <a:t>30/11/2021</a:t>
             </a:fld>
             <a:endParaRPr lang="pt-BR"/>
           </a:p>
@@ -1782,7 +1782,7 @@
           <a:p>
             <a:fld id="{C0C7093E-3454-4D60-86CF-1DF1D2C66BEB}" type="datetimeFigureOut">
               <a:rPr lang="pt-BR" smtClean="0"/>
-              <a:t>29/11/2021</a:t>
+              <a:t>30/11/2021</a:t>
             </a:fld>
             <a:endParaRPr lang="pt-BR"/>
           </a:p>
@@ -2054,7 +2054,7 @@
           <a:p>
             <a:fld id="{C0C7093E-3454-4D60-86CF-1DF1D2C66BEB}" type="datetimeFigureOut">
               <a:rPr lang="pt-BR" smtClean="0"/>
-              <a:t>29/11/2021</a:t>
+              <a:t>30/11/2021</a:t>
             </a:fld>
             <a:endParaRPr lang="pt-BR"/>
           </a:p>
@@ -2306,7 +2306,7 @@
           <a:p>
             <a:fld id="{C0C7093E-3454-4D60-86CF-1DF1D2C66BEB}" type="datetimeFigureOut">
               <a:rPr lang="pt-BR" smtClean="0"/>
-              <a:t>29/11/2021</a:t>
+              <a:t>30/11/2021</a:t>
             </a:fld>
             <a:endParaRPr lang="pt-BR"/>
           </a:p>
@@ -2517,7 +2517,7 @@
           <a:p>
             <a:fld id="{C0C7093E-3454-4D60-86CF-1DF1D2C66BEB}" type="datetimeFigureOut">
               <a:rPr lang="pt-BR" smtClean="0"/>
-              <a:t>29/11/2021</a:t>
+              <a:t>30/11/2021</a:t>
             </a:fld>
             <a:endParaRPr lang="pt-BR"/>
           </a:p>
@@ -2901,7 +2901,7 @@
 </file>
 
 <file path=ppt/slides/slide1.xml><?xml version="1.0" encoding="utf-8"?>
-<p:sld xmlns:a="http://schemas.openxmlformats.org/drawingml/2006/main" xmlns:r="http://schemas.openxmlformats.org/officeDocument/2006/relationships" xmlns:p="http://schemas.openxmlformats.org/presentationml/2006/main">
+<p:sld xmlns:a="http://schemas.openxmlformats.org/drawingml/2006/main" xmlns:r="http://schemas.openxmlformats.org/officeDocument/2006/relationships" xmlns:p="http://schemas.openxmlformats.org/presentationml/2006/main" show="0">
   <p:cSld>
     <p:spTree>
       <p:nvGrpSpPr>
@@ -5454,13 +5454,19 @@
       </p:grpSpPr>
       <p:sp>
         <p:nvSpPr>
-          <p:cNvPr id="14" name="Fluxograma: Disco Magnético 13"/>
+          <p:cNvPr id="62" name="Fluxograma: Disco Magnético 61">
+            <a:extLst>
+              <a:ext uri="{FF2B5EF4-FFF2-40B4-BE49-F238E27FC236}">
+                <a16:creationId xmlns:a16="http://schemas.microsoft.com/office/drawing/2014/main" id="{DA559A7A-8354-437F-8753-FC8ABC6C1BB0}"/>
+              </a:ext>
+            </a:extLst>
+          </p:cNvPr>
           <p:cNvSpPr/>
           <p:nvPr/>
         </p:nvSpPr>
         <p:spPr>
           <a:xfrm>
-            <a:off x="232558" y="1124912"/>
+            <a:off x="969158" y="1366519"/>
             <a:ext cx="2426120" cy="1904818"/>
           </a:xfrm>
           <a:prstGeom prst="flowChartMagneticDisk">
@@ -5509,13 +5515,19 @@
       </p:sp>
       <p:sp>
         <p:nvSpPr>
-          <p:cNvPr id="15" name="Retângulo 20"/>
+          <p:cNvPr id="66" name="Retângulo 20">
+            <a:extLst>
+              <a:ext uri="{FF2B5EF4-FFF2-40B4-BE49-F238E27FC236}">
+                <a16:creationId xmlns:a16="http://schemas.microsoft.com/office/drawing/2014/main" id="{EA739D68-9497-4950-A810-C4F378961890}"/>
+              </a:ext>
+            </a:extLst>
+          </p:cNvPr>
           <p:cNvSpPr/>
           <p:nvPr/>
         </p:nvSpPr>
         <p:spPr>
           <a:xfrm>
-            <a:off x="357059" y="1803342"/>
+            <a:off x="1093659" y="2044949"/>
             <a:ext cx="2151424" cy="523220"/>
           </a:xfrm>
           <a:prstGeom prst="rect">
@@ -5552,13 +5564,19 @@
       </p:sp>
       <p:sp>
         <p:nvSpPr>
-          <p:cNvPr id="16" name="Retângulo 20"/>
+          <p:cNvPr id="67" name="Retângulo 20">
+            <a:extLst>
+              <a:ext uri="{FF2B5EF4-FFF2-40B4-BE49-F238E27FC236}">
+                <a16:creationId xmlns:a16="http://schemas.microsoft.com/office/drawing/2014/main" id="{2591485A-23ED-427F-BDCC-DC0390CECA0B}"/>
+              </a:ext>
+            </a:extLst>
+          </p:cNvPr>
           <p:cNvSpPr/>
           <p:nvPr/>
         </p:nvSpPr>
         <p:spPr>
           <a:xfrm>
-            <a:off x="350969" y="2326562"/>
+            <a:off x="1087569" y="2568169"/>
             <a:ext cx="2157474" cy="600164"/>
           </a:xfrm>
           <a:prstGeom prst="rect">
@@ -5584,13 +5602,19 @@
       </p:sp>
       <p:grpSp>
         <p:nvGrpSpPr>
-          <p:cNvPr id="17" name="Group 79"/>
+          <p:cNvPr id="68" name="Group 79">
+            <a:extLst>
+              <a:ext uri="{FF2B5EF4-FFF2-40B4-BE49-F238E27FC236}">
+                <a16:creationId xmlns:a16="http://schemas.microsoft.com/office/drawing/2014/main" id="{8CC7F6C1-EE95-4B2B-9502-B961CD91721D}"/>
+              </a:ext>
+            </a:extLst>
+          </p:cNvPr>
           <p:cNvGrpSpPr/>
           <p:nvPr/>
         </p:nvGrpSpPr>
         <p:grpSpPr>
           <a:xfrm>
-            <a:off x="6495068" y="1290077"/>
+            <a:off x="4828927" y="1530562"/>
             <a:ext cx="2407793" cy="1576732"/>
             <a:chOff x="3676482" y="4877728"/>
             <a:chExt cx="2710479" cy="2016224"/>
@@ -5598,7 +5622,13 @@
         </p:grpSpPr>
         <p:sp>
           <p:nvSpPr>
-            <p:cNvPr id="18" name="Retângulo 57"/>
+            <p:cNvPr id="69" name="Retângulo 57">
+              <a:extLst>
+                <a:ext uri="{FF2B5EF4-FFF2-40B4-BE49-F238E27FC236}">
+                  <a16:creationId xmlns:a16="http://schemas.microsoft.com/office/drawing/2014/main" id="{3E18610E-13AA-4568-81CA-999EEA3D27BF}"/>
+                </a:ext>
+              </a:extLst>
+            </p:cNvPr>
             <p:cNvSpPr/>
             <p:nvPr/>
           </p:nvSpPr>
@@ -5653,14 +5683,20 @@
         </p:sp>
         <p:sp>
           <p:nvSpPr>
-            <p:cNvPr id="19" name="Retângulo 58"/>
+            <p:cNvPr id="70" name="Retângulo 58">
+              <a:extLst>
+                <a:ext uri="{FF2B5EF4-FFF2-40B4-BE49-F238E27FC236}">
+                  <a16:creationId xmlns:a16="http://schemas.microsoft.com/office/drawing/2014/main" id="{8DC0CE34-3188-45C6-B6D8-64CBEF0217DF}"/>
+                </a:ext>
+              </a:extLst>
+            </p:cNvPr>
             <p:cNvSpPr/>
             <p:nvPr/>
           </p:nvSpPr>
           <p:spPr>
             <a:xfrm>
-              <a:off x="3892510" y="5743939"/>
-              <a:ext cx="2278426" cy="767451"/>
+              <a:off x="3892510" y="5743938"/>
+              <a:ext cx="2278427" cy="767451"/>
             </a:xfrm>
             <a:prstGeom prst="rect">
               <a:avLst/>
@@ -5688,7 +5724,13 @@
         </p:sp>
         <p:sp>
           <p:nvSpPr>
-            <p:cNvPr id="20" name="Retângulo 20"/>
+            <p:cNvPr id="71" name="Retângulo 20">
+              <a:extLst>
+                <a:ext uri="{FF2B5EF4-FFF2-40B4-BE49-F238E27FC236}">
+                  <a16:creationId xmlns:a16="http://schemas.microsoft.com/office/drawing/2014/main" id="{6C5CE8C8-EA7F-4BE6-85DD-71B3DF462225}"/>
+                </a:ext>
+              </a:extLst>
+            </p:cNvPr>
             <p:cNvSpPr/>
             <p:nvPr/>
           </p:nvSpPr>
@@ -5737,13 +5779,19 @@
       </p:grpSp>
       <p:grpSp>
         <p:nvGrpSpPr>
-          <p:cNvPr id="89" name="Group 38"/>
+          <p:cNvPr id="72" name="Group 38">
+            <a:extLst>
+              <a:ext uri="{FF2B5EF4-FFF2-40B4-BE49-F238E27FC236}">
+                <a16:creationId xmlns:a16="http://schemas.microsoft.com/office/drawing/2014/main" id="{16D1C6A8-C909-49E0-A062-41BCFB5A46EE}"/>
+              </a:ext>
+            </a:extLst>
+          </p:cNvPr>
           <p:cNvGrpSpPr/>
           <p:nvPr/>
         </p:nvGrpSpPr>
         <p:grpSpPr>
           <a:xfrm>
-            <a:off x="5397755" y="4230987"/>
+            <a:off x="6134355" y="4497687"/>
             <a:ext cx="2032928" cy="1310769"/>
             <a:chOff x="8733794" y="1515280"/>
             <a:chExt cx="2568774" cy="2016224"/>
@@ -5751,7 +5799,13 @@
         </p:grpSpPr>
         <p:sp>
           <p:nvSpPr>
-            <p:cNvPr id="90" name="Retângulo 89"/>
+            <p:cNvPr id="73" name="Retângulo 72">
+              <a:extLst>
+                <a:ext uri="{FF2B5EF4-FFF2-40B4-BE49-F238E27FC236}">
+                  <a16:creationId xmlns:a16="http://schemas.microsoft.com/office/drawing/2014/main" id="{FB132C85-5E11-4901-991F-11F6355ACF4A}"/>
+                </a:ext>
+              </a:extLst>
+            </p:cNvPr>
             <p:cNvSpPr/>
             <p:nvPr/>
           </p:nvSpPr>
@@ -5796,7 +5850,13 @@
         </p:sp>
         <p:sp>
           <p:nvSpPr>
-            <p:cNvPr id="91" name="Retângulo 90"/>
+            <p:cNvPr id="74" name="Retângulo 73">
+              <a:extLst>
+                <a:ext uri="{FF2B5EF4-FFF2-40B4-BE49-F238E27FC236}">
+                  <a16:creationId xmlns:a16="http://schemas.microsoft.com/office/drawing/2014/main" id="{09DFC64E-FC00-4A8F-BCF0-B5F51BFDC282}"/>
+                </a:ext>
+              </a:extLst>
+            </p:cNvPr>
             <p:cNvSpPr/>
             <p:nvPr/>
           </p:nvSpPr>
@@ -5852,7 +5912,13 @@
         </p:sp>
         <p:sp>
           <p:nvSpPr>
-            <p:cNvPr id="92" name="Retângulo 20"/>
+            <p:cNvPr id="75" name="Retângulo 20">
+              <a:extLst>
+                <a:ext uri="{FF2B5EF4-FFF2-40B4-BE49-F238E27FC236}">
+                  <a16:creationId xmlns:a16="http://schemas.microsoft.com/office/drawing/2014/main" id="{644A358A-939E-4F13-BFC5-22CCA3A97DA8}"/>
+                </a:ext>
+              </a:extLst>
+            </p:cNvPr>
             <p:cNvSpPr/>
             <p:nvPr/>
           </p:nvSpPr>
@@ -5888,13 +5954,19 @@
       </p:grpSp>
       <p:grpSp>
         <p:nvGrpSpPr>
-          <p:cNvPr id="118" name="Group 38"/>
+          <p:cNvPr id="76" name="Group 38">
+            <a:extLst>
+              <a:ext uri="{FF2B5EF4-FFF2-40B4-BE49-F238E27FC236}">
+                <a16:creationId xmlns:a16="http://schemas.microsoft.com/office/drawing/2014/main" id="{8B389E9E-D924-4138-994B-96A9F948035F}"/>
+              </a:ext>
+            </a:extLst>
+          </p:cNvPr>
           <p:cNvGrpSpPr/>
           <p:nvPr/>
         </p:nvGrpSpPr>
         <p:grpSpPr>
           <a:xfrm>
-            <a:off x="7581702" y="4252482"/>
+            <a:off x="8445348" y="2878056"/>
             <a:ext cx="2135317" cy="1327125"/>
             <a:chOff x="8797862" y="1558509"/>
             <a:chExt cx="2574728" cy="2016224"/>
@@ -5902,7 +5974,13 @@
         </p:grpSpPr>
         <p:sp>
           <p:nvSpPr>
-            <p:cNvPr id="119" name="Retângulo 118"/>
+            <p:cNvPr id="77" name="Retângulo 76">
+              <a:extLst>
+                <a:ext uri="{FF2B5EF4-FFF2-40B4-BE49-F238E27FC236}">
+                  <a16:creationId xmlns:a16="http://schemas.microsoft.com/office/drawing/2014/main" id="{19FF8D1B-3D84-4221-845F-EEFC647822E2}"/>
+                </a:ext>
+              </a:extLst>
+            </p:cNvPr>
             <p:cNvSpPr/>
             <p:nvPr/>
           </p:nvSpPr>
@@ -5947,7 +6025,13 @@
         </p:sp>
         <p:sp>
           <p:nvSpPr>
-            <p:cNvPr id="120" name="Retângulo 119"/>
+            <p:cNvPr id="78" name="Retângulo 77">
+              <a:extLst>
+                <a:ext uri="{FF2B5EF4-FFF2-40B4-BE49-F238E27FC236}">
+                  <a16:creationId xmlns:a16="http://schemas.microsoft.com/office/drawing/2014/main" id="{3368A02F-3447-4A2C-B7F9-F1368975DC41}"/>
+                </a:ext>
+              </a:extLst>
+            </p:cNvPr>
             <p:cNvSpPr/>
             <p:nvPr/>
           </p:nvSpPr>
@@ -6003,7 +6087,13 @@
         </p:sp>
         <p:sp>
           <p:nvSpPr>
-            <p:cNvPr id="121" name="Retângulo 20"/>
+            <p:cNvPr id="79" name="Retângulo 20">
+              <a:extLst>
+                <a:ext uri="{FF2B5EF4-FFF2-40B4-BE49-F238E27FC236}">
+                  <a16:creationId xmlns:a16="http://schemas.microsoft.com/office/drawing/2014/main" id="{70606265-26A0-46AD-B167-1E0E29BB72BB}"/>
+                </a:ext>
+              </a:extLst>
+            </p:cNvPr>
             <p:cNvSpPr/>
             <p:nvPr/>
           </p:nvSpPr>
@@ -6044,13 +6134,19 @@
       </p:grpSp>
       <p:grpSp>
         <p:nvGrpSpPr>
-          <p:cNvPr id="22" name="Group 38"/>
+          <p:cNvPr id="80" name="Group 38">
+            <a:extLst>
+              <a:ext uri="{FF2B5EF4-FFF2-40B4-BE49-F238E27FC236}">
+                <a16:creationId xmlns:a16="http://schemas.microsoft.com/office/drawing/2014/main" id="{2ED41467-1716-4A98-8CBA-C020E0DC59A8}"/>
+              </a:ext>
+            </a:extLst>
+          </p:cNvPr>
           <p:cNvGrpSpPr/>
           <p:nvPr/>
         </p:nvGrpSpPr>
         <p:grpSpPr>
           <a:xfrm>
-            <a:off x="3133278" y="4252482"/>
+            <a:off x="3869878" y="4519182"/>
             <a:ext cx="2084302" cy="1311224"/>
             <a:chOff x="8753954" y="1548927"/>
             <a:chExt cx="2566458" cy="2016224"/>
@@ -6058,7 +6154,13 @@
         </p:grpSpPr>
         <p:sp>
           <p:nvSpPr>
-            <p:cNvPr id="23" name="Retângulo 118"/>
+            <p:cNvPr id="81" name="Retângulo 118">
+              <a:extLst>
+                <a:ext uri="{FF2B5EF4-FFF2-40B4-BE49-F238E27FC236}">
+                  <a16:creationId xmlns:a16="http://schemas.microsoft.com/office/drawing/2014/main" id="{3EC9B02B-A12A-49EB-A2C7-219980F0714F}"/>
+                </a:ext>
+              </a:extLst>
+            </p:cNvPr>
             <p:cNvSpPr/>
             <p:nvPr/>
           </p:nvSpPr>
@@ -6103,7 +6205,13 @@
         </p:sp>
         <p:sp>
           <p:nvSpPr>
-            <p:cNvPr id="24" name="Retângulo 119"/>
+            <p:cNvPr id="82" name="Retângulo 119">
+              <a:extLst>
+                <a:ext uri="{FF2B5EF4-FFF2-40B4-BE49-F238E27FC236}">
+                  <a16:creationId xmlns:a16="http://schemas.microsoft.com/office/drawing/2014/main" id="{574449B1-9E69-4E13-A9A4-F7C2348E72F9}"/>
+                </a:ext>
+              </a:extLst>
+            </p:cNvPr>
             <p:cNvSpPr/>
             <p:nvPr/>
           </p:nvSpPr>
@@ -6159,7 +6267,13 @@
         </p:sp>
         <p:sp>
           <p:nvSpPr>
-            <p:cNvPr id="42" name="Retângulo 20"/>
+            <p:cNvPr id="83" name="Retângulo 20">
+              <a:extLst>
+                <a:ext uri="{FF2B5EF4-FFF2-40B4-BE49-F238E27FC236}">
+                  <a16:creationId xmlns:a16="http://schemas.microsoft.com/office/drawing/2014/main" id="{FA813981-4B1B-48B5-9674-FEE039803E4F}"/>
+                </a:ext>
+              </a:extLst>
+            </p:cNvPr>
             <p:cNvSpPr/>
             <p:nvPr/>
           </p:nvSpPr>
@@ -6195,28 +6309,40 @@
       </p:grpSp>
       <p:grpSp>
         <p:nvGrpSpPr>
-          <p:cNvPr id="61" name="Group 38"/>
+          <p:cNvPr id="84" name="Group 38">
+            <a:extLst>
+              <a:ext uri="{FF2B5EF4-FFF2-40B4-BE49-F238E27FC236}">
+                <a16:creationId xmlns:a16="http://schemas.microsoft.com/office/drawing/2014/main" id="{DA8FE619-DE68-4D41-8B0C-C2C0F6204393}"/>
+              </a:ext>
+            </a:extLst>
+          </p:cNvPr>
           <p:cNvGrpSpPr/>
           <p:nvPr/>
         </p:nvGrpSpPr>
         <p:grpSpPr>
           <a:xfrm>
-            <a:off x="9894334" y="4248847"/>
+            <a:off x="8419481" y="845326"/>
             <a:ext cx="2134802" cy="1318493"/>
-            <a:chOff x="8712688" y="1524475"/>
+            <a:chOff x="8699996" y="1248912"/>
             <a:chExt cx="2647633" cy="2016224"/>
           </a:xfrm>
         </p:grpSpPr>
         <p:sp>
           <p:nvSpPr>
-            <p:cNvPr id="63" name="Retângulo 118"/>
+            <p:cNvPr id="86" name="Retângulo 118">
+              <a:extLst>
+                <a:ext uri="{FF2B5EF4-FFF2-40B4-BE49-F238E27FC236}">
+                  <a16:creationId xmlns:a16="http://schemas.microsoft.com/office/drawing/2014/main" id="{CD1D4072-FAF3-4E89-B6EA-47D8265F2A57}"/>
+                </a:ext>
+              </a:extLst>
+            </p:cNvPr>
             <p:cNvSpPr/>
             <p:nvPr/>
           </p:nvSpPr>
           <p:spPr>
             <a:xfrm>
-              <a:off x="8835644" y="1524475"/>
-              <a:ext cx="2376264" cy="2016224"/>
+              <a:off x="8822952" y="1248912"/>
+              <a:ext cx="2376265" cy="2016224"/>
             </a:xfrm>
             <a:prstGeom prst="rect">
               <a:avLst/>
@@ -6254,13 +6380,19 @@
         </p:sp>
         <p:sp>
           <p:nvSpPr>
-            <p:cNvPr id="64" name="Retângulo 119"/>
+            <p:cNvPr id="87" name="Retângulo 119">
+              <a:extLst>
+                <a:ext uri="{FF2B5EF4-FFF2-40B4-BE49-F238E27FC236}">
+                  <a16:creationId xmlns:a16="http://schemas.microsoft.com/office/drawing/2014/main" id="{65FC4E1A-75FF-4F71-A603-740EFEC23325}"/>
+                </a:ext>
+              </a:extLst>
+            </p:cNvPr>
             <p:cNvSpPr/>
             <p:nvPr/>
           </p:nvSpPr>
           <p:spPr>
             <a:xfrm>
-              <a:off x="8712688" y="1622323"/>
+              <a:off x="8699996" y="1346760"/>
               <a:ext cx="2647633" cy="705973"/>
             </a:xfrm>
             <a:prstGeom prst="rect">
@@ -6310,13 +6442,19 @@
         </p:sp>
         <p:sp>
           <p:nvSpPr>
-            <p:cNvPr id="65" name="Retângulo 20"/>
+            <p:cNvPr id="88" name="Retângulo 20">
+              <a:extLst>
+                <a:ext uri="{FF2B5EF4-FFF2-40B4-BE49-F238E27FC236}">
+                  <a16:creationId xmlns:a16="http://schemas.microsoft.com/office/drawing/2014/main" id="{77A1E8E2-ACB3-4C86-A1EE-C5E9BDDA4E7D}"/>
+                </a:ext>
+              </a:extLst>
+            </p:cNvPr>
             <p:cNvSpPr/>
             <p:nvPr/>
           </p:nvSpPr>
           <p:spPr>
             <a:xfrm>
-              <a:off x="8753276" y="2491225"/>
+              <a:off x="8740583" y="2215662"/>
               <a:ext cx="2566458" cy="658907"/>
             </a:xfrm>
             <a:prstGeom prst="rect">
@@ -6357,181 +6495,12 @@
           </p:txBody>
         </p:sp>
       </p:grpSp>
-      <p:grpSp>
-        <p:nvGrpSpPr>
-          <p:cNvPr id="30" name="Group 38">
+      <p:sp>
+        <p:nvSpPr>
+          <p:cNvPr id="93" name="Retângulo 92">
             <a:extLst>
               <a:ext uri="{FF2B5EF4-FFF2-40B4-BE49-F238E27FC236}">
-                <a16:creationId xmlns:a16="http://schemas.microsoft.com/office/drawing/2014/main" id="{4EBBFC9C-1DF9-4A6F-8A40-538CCE718358}"/>
-              </a:ext>
-            </a:extLst>
-          </p:cNvPr>
-          <p:cNvGrpSpPr/>
-          <p:nvPr/>
-        </p:nvGrpSpPr>
-        <p:grpSpPr>
-          <a:xfrm>
-            <a:off x="3729867" y="1128795"/>
-            <a:ext cx="2167452" cy="1899850"/>
-            <a:chOff x="8867421" y="1547039"/>
-            <a:chExt cx="2376265" cy="2016224"/>
-          </a:xfrm>
-        </p:grpSpPr>
-        <p:sp>
-          <p:nvSpPr>
-            <p:cNvPr id="31" name="Retângulo 30">
-              <a:extLst>
-                <a:ext uri="{FF2B5EF4-FFF2-40B4-BE49-F238E27FC236}">
-                  <a16:creationId xmlns:a16="http://schemas.microsoft.com/office/drawing/2014/main" id="{4993CE81-99DA-4027-B6DC-BF33269C9E8F}"/>
-                </a:ext>
-              </a:extLst>
-            </p:cNvPr>
-            <p:cNvSpPr/>
-            <p:nvPr/>
-          </p:nvSpPr>
-          <p:spPr>
-            <a:xfrm>
-              <a:off x="8867422" y="1547039"/>
-              <a:ext cx="2376264" cy="2016224"/>
-            </a:xfrm>
-            <a:prstGeom prst="rect">
-              <a:avLst/>
-            </a:prstGeom>
-          </p:spPr>
-          <p:style>
-            <a:lnRef idx="2">
-              <a:schemeClr val="accent5">
-                <a:shade val="50000"/>
-              </a:schemeClr>
-            </a:lnRef>
-            <a:fillRef idx="1">
-              <a:schemeClr val="accent5"/>
-            </a:fillRef>
-            <a:effectRef idx="0">
-              <a:schemeClr val="accent5"/>
-            </a:effectRef>
-            <a:fontRef idx="minor">
-              <a:schemeClr val="lt1"/>
-            </a:fontRef>
-          </p:style>
-          <p:txBody>
-            <a:bodyPr rtlCol="0" anchor="ctr"/>
-            <a:lstStyle/>
-            <a:p>
-              <a:pPr algn="ctr"/>
-              <a:endParaRPr lang="pt-BR" sz="1800">
-                <a:solidFill>
-                  <a:prstClr val="white"/>
-                </a:solidFill>
-                <a:latin typeface="Calibri"/>
-              </a:endParaRPr>
-            </a:p>
-          </p:txBody>
-        </p:sp>
-        <p:sp>
-          <p:nvSpPr>
-            <p:cNvPr id="32" name="Retângulo 31">
-              <a:extLst>
-                <a:ext uri="{FF2B5EF4-FFF2-40B4-BE49-F238E27FC236}">
-                  <a16:creationId xmlns:a16="http://schemas.microsoft.com/office/drawing/2014/main" id="{49C4ED83-53A4-411F-8C3A-71B83109BC1A}"/>
-                </a:ext>
-              </a:extLst>
-            </p:cNvPr>
-            <p:cNvSpPr/>
-            <p:nvPr/>
-          </p:nvSpPr>
-          <p:spPr>
-            <a:xfrm>
-              <a:off x="8867421" y="1715859"/>
-              <a:ext cx="2376264" cy="587933"/>
-            </a:xfrm>
-            <a:prstGeom prst="rect">
-              <a:avLst/>
-            </a:prstGeom>
-          </p:spPr>
-          <p:txBody>
-            <a:bodyPr wrap="square" lIns="91440" tIns="45720" rIns="91440" bIns="45720" anchor="t">
-              <a:spAutoFit/>
-            </a:bodyPr>
-            <a:lstStyle/>
-            <a:p>
-              <a:pPr lvl="0" algn="ctr">
-                <a:defRPr/>
-              </a:pPr>
-              <a:r>
-                <a:rPr lang="pt-BR" sz="1600" b="1" dirty="0"/>
-                <a:t>Microservice</a:t>
-              </a:r>
-              <a:endParaRPr lang="pt-BR" sz="1600" b="1" dirty="0">
-                <a:cs typeface="Calibri"/>
-              </a:endParaRPr>
-            </a:p>
-            <a:p>
-              <a:pPr algn="ctr">
-                <a:defRPr/>
-              </a:pPr>
-              <a:r>
-                <a:rPr lang="pt-BR" sz="1200" dirty="0"/>
-                <a:t>[</a:t>
-              </a:r>
-              <a:r>
-                <a:rPr lang="pt-BR" sz="1400" dirty="0"/>
-                <a:t>Container: </a:t>
-              </a:r>
-              <a:r>
-                <a:rPr lang="pt-BR" sz="1200" dirty="0"/>
-                <a:t>Spring Boot]</a:t>
-              </a:r>
-              <a:endParaRPr lang="pt-BR" sz="1200" dirty="0">
-                <a:cs typeface="Calibri"/>
-              </a:endParaRPr>
-            </a:p>
-          </p:txBody>
-        </p:sp>
-        <p:sp>
-          <p:nvSpPr>
-            <p:cNvPr id="33" name="Retângulo 20">
-              <a:extLst>
-                <a:ext uri="{FF2B5EF4-FFF2-40B4-BE49-F238E27FC236}">
-                  <a16:creationId xmlns:a16="http://schemas.microsoft.com/office/drawing/2014/main" id="{B47C07C1-929B-43B6-A612-7584787622FC}"/>
-                </a:ext>
-              </a:extLst>
-            </p:cNvPr>
-            <p:cNvSpPr/>
-            <p:nvPr/>
-          </p:nvSpPr>
-          <p:spPr>
-            <a:xfrm>
-              <a:off x="9037739" y="2349238"/>
-              <a:ext cx="2035627" cy="816573"/>
-            </a:xfrm>
-            <a:prstGeom prst="rect">
-              <a:avLst/>
-            </a:prstGeom>
-          </p:spPr>
-          <p:txBody>
-            <a:bodyPr wrap="square" lIns="91440" tIns="45720" rIns="91440" bIns="45720" anchor="t">
-              <a:spAutoFit/>
-            </a:bodyPr>
-            <a:lstStyle/>
-            <a:p>
-              <a:pPr lvl="0" algn="ctr">
-                <a:defRPr/>
-              </a:pPr>
-              <a:r>
-                <a:rPr lang="pt-BR" sz="1100" dirty="0"/>
-                <a:t>Aplicação para manipulação de dados de agendamentos dos locatários e seus centros esportivos</a:t>
-              </a:r>
-            </a:p>
-          </p:txBody>
-        </p:sp>
-      </p:grpSp>
-      <p:sp>
-        <p:nvSpPr>
-          <p:cNvPr id="36" name="Retângulo 35">
-            <a:extLst>
-              <a:ext uri="{FF2B5EF4-FFF2-40B4-BE49-F238E27FC236}">
-                <a16:creationId xmlns:a16="http://schemas.microsoft.com/office/drawing/2014/main" id="{40D7BF1A-655B-324F-B3D4-B1A904D3B5CE}"/>
+                <a16:creationId xmlns:a16="http://schemas.microsoft.com/office/drawing/2014/main" id="{DBBAF283-DFB2-4986-A4C4-CC90DA0195DD}"/>
               </a:ext>
             </a:extLst>
           </p:cNvPr>
@@ -6540,8 +6509,8 @@
         </p:nvSpPr>
         <p:spPr>
           <a:xfrm>
-            <a:off x="3085938" y="694481"/>
-            <a:ext cx="8929390" cy="5724312"/>
+            <a:off x="3822538" y="649101"/>
+            <a:ext cx="6934362" cy="5498748"/>
           </a:xfrm>
           <a:prstGeom prst="rect">
             <a:avLst/>
@@ -6549,7 +6518,7 @@
           <a:noFill/>
           <a:ln>
             <a:solidFill>
-              <a:srgbClr val="253746"/>
+              <a:schemeClr val="bg1"/>
             </a:solidFill>
             <a:prstDash val="dash"/>
           </a:ln>
@@ -6680,24 +6649,24 @@
       </p:sp>
       <p:cxnSp>
         <p:nvCxnSpPr>
-          <p:cNvPr id="46" name="Conector de Seta Reta 107">
+          <p:cNvPr id="94" name="Conector de Seta Reta 107">
             <a:extLst>
               <a:ext uri="{FF2B5EF4-FFF2-40B4-BE49-F238E27FC236}">
-                <a16:creationId xmlns:a16="http://schemas.microsoft.com/office/drawing/2014/main" id="{F61BA03D-09C9-4CDA-9AA0-7459B1EE8A17}"/>
+                <a16:creationId xmlns:a16="http://schemas.microsoft.com/office/drawing/2014/main" id="{DF60FDAA-AD7D-454B-9C6D-48CBEDEC2F23}"/>
               </a:ext>
             </a:extLst>
           </p:cNvPr>
           <p:cNvCxnSpPr>
             <a:cxnSpLocks/>
-            <a:stCxn id="31" idx="1"/>
-            <a:endCxn id="14" idx="4"/>
+            <a:stCxn id="69" idx="1"/>
+            <a:endCxn id="62" idx="4"/>
           </p:cNvCxnSpPr>
           <p:nvPr/>
         </p:nvCxnSpPr>
         <p:spPr>
-          <a:xfrm flipH="1" flipV="1">
-            <a:off x="2658678" y="2077321"/>
-            <a:ext cx="1071192" cy="1399"/>
+          <a:xfrm flipH="1">
+            <a:off x="3395278" y="2318928"/>
+            <a:ext cx="1433653" cy="0"/>
           </a:xfrm>
           <a:prstGeom prst="straightConnector1">
             <a:avLst/>
@@ -6730,24 +6699,147 @@
       </p:cxnSp>
       <p:cxnSp>
         <p:nvCxnSpPr>
-          <p:cNvPr id="49" name="Conector de Seta Reta 107">
+          <p:cNvPr id="95" name="Conector reto 94">
             <a:extLst>
               <a:ext uri="{FF2B5EF4-FFF2-40B4-BE49-F238E27FC236}">
-                <a16:creationId xmlns:a16="http://schemas.microsoft.com/office/drawing/2014/main" id="{F8B8441F-D7A3-4068-BC15-F853813B13FA}"/>
+                <a16:creationId xmlns:a16="http://schemas.microsoft.com/office/drawing/2014/main" id="{A86E81BD-17DD-4B4C-9174-13CFCD216E37}"/>
               </a:ext>
             </a:extLst>
           </p:cNvPr>
           <p:cNvCxnSpPr>
             <a:cxnSpLocks/>
-            <a:stCxn id="18" idx="1"/>
-            <a:endCxn id="31" idx="3"/>
+            <a:stCxn id="81" idx="0"/>
           </p:cNvCxnSpPr>
           <p:nvPr/>
         </p:nvCxnSpPr>
         <p:spPr>
-          <a:xfrm flipH="1">
-            <a:off x="5897322" y="2078443"/>
-            <a:ext cx="597750" cy="277"/>
+          <a:xfrm flipV="1">
+            <a:off x="4928097" y="3920524"/>
+            <a:ext cx="3" cy="598658"/>
+          </a:xfrm>
+          <a:prstGeom prst="line">
+            <a:avLst/>
+          </a:prstGeom>
+          <a:ln w="19050">
+            <a:prstDash val="sysDash"/>
+          </a:ln>
+        </p:spPr>
+        <p:style>
+          <a:lnRef idx="1">
+            <a:schemeClr val="accent1"/>
+          </a:lnRef>
+          <a:fillRef idx="0">
+            <a:schemeClr val="accent1"/>
+          </a:fillRef>
+          <a:effectRef idx="0">
+            <a:schemeClr val="accent1"/>
+          </a:effectRef>
+          <a:fontRef idx="minor">
+            <a:schemeClr val="tx1"/>
+          </a:fontRef>
+        </p:style>
+      </p:cxnSp>
+      <p:cxnSp>
+        <p:nvCxnSpPr>
+          <p:cNvPr id="96" name="Conector reto 95">
+            <a:extLst>
+              <a:ext uri="{FF2B5EF4-FFF2-40B4-BE49-F238E27FC236}">
+                <a16:creationId xmlns:a16="http://schemas.microsoft.com/office/drawing/2014/main" id="{66D4016B-368C-4260-8337-C9BB5D3A755E}"/>
+              </a:ext>
+            </a:extLst>
+          </p:cNvPr>
+          <p:cNvCxnSpPr>
+            <a:cxnSpLocks/>
+            <a:stCxn id="73" idx="0"/>
+          </p:cNvCxnSpPr>
+          <p:nvPr/>
+        </p:nvCxnSpPr>
+        <p:spPr>
+          <a:xfrm flipV="1">
+            <a:off x="7150493" y="3912675"/>
+            <a:ext cx="0" cy="585012"/>
+          </a:xfrm>
+          <a:prstGeom prst="line">
+            <a:avLst/>
+          </a:prstGeom>
+          <a:ln w="19050">
+            <a:prstDash val="sysDash"/>
+          </a:ln>
+        </p:spPr>
+        <p:style>
+          <a:lnRef idx="1">
+            <a:schemeClr val="accent1"/>
+          </a:lnRef>
+          <a:fillRef idx="0">
+            <a:schemeClr val="accent1"/>
+          </a:fillRef>
+          <a:effectRef idx="0">
+            <a:schemeClr val="accent1"/>
+          </a:effectRef>
+          <a:fontRef idx="minor">
+            <a:schemeClr val="tx1"/>
+          </a:fontRef>
+        </p:style>
+      </p:cxnSp>
+      <p:cxnSp>
+        <p:nvCxnSpPr>
+          <p:cNvPr id="97" name="Conector reto 96">
+            <a:extLst>
+              <a:ext uri="{FF2B5EF4-FFF2-40B4-BE49-F238E27FC236}">
+                <a16:creationId xmlns:a16="http://schemas.microsoft.com/office/drawing/2014/main" id="{EAD64441-E1E4-4A86-B7BE-C6C7B1A652E4}"/>
+              </a:ext>
+            </a:extLst>
+          </p:cNvPr>
+          <p:cNvCxnSpPr>
+            <a:cxnSpLocks/>
+          </p:cNvCxnSpPr>
+          <p:nvPr/>
+        </p:nvCxnSpPr>
+        <p:spPr>
+          <a:xfrm flipH="1" flipV="1">
+            <a:off x="4919816" y="3912675"/>
+            <a:ext cx="2230677" cy="7849"/>
+          </a:xfrm>
+          <a:prstGeom prst="line">
+            <a:avLst/>
+          </a:prstGeom>
+          <a:ln w="19050">
+            <a:prstDash val="sysDash"/>
+          </a:ln>
+        </p:spPr>
+        <p:style>
+          <a:lnRef idx="1">
+            <a:schemeClr val="accent1"/>
+          </a:lnRef>
+          <a:fillRef idx="0">
+            <a:schemeClr val="accent1"/>
+          </a:fillRef>
+          <a:effectRef idx="0">
+            <a:schemeClr val="accent1"/>
+          </a:effectRef>
+          <a:fontRef idx="minor">
+            <a:schemeClr val="tx1"/>
+          </a:fontRef>
+        </p:style>
+      </p:cxnSp>
+      <p:cxnSp>
+        <p:nvCxnSpPr>
+          <p:cNvPr id="98" name="Conector de Seta Reta 107">
+            <a:extLst>
+              <a:ext uri="{FF2B5EF4-FFF2-40B4-BE49-F238E27FC236}">
+                <a16:creationId xmlns:a16="http://schemas.microsoft.com/office/drawing/2014/main" id="{63709C5C-C8B0-4426-9267-E6569649DC3C}"/>
+              </a:ext>
+            </a:extLst>
+          </p:cNvPr>
+          <p:cNvCxnSpPr>
+            <a:cxnSpLocks/>
+          </p:cNvCxnSpPr>
+          <p:nvPr/>
+        </p:nvCxnSpPr>
+        <p:spPr>
+          <a:xfrm flipV="1">
+            <a:off x="6032824" y="3113416"/>
+            <a:ext cx="4659" cy="787015"/>
           </a:xfrm>
           <a:prstGeom prst="straightConnector1">
             <a:avLst/>
@@ -6780,23 +6872,22 @@
       </p:cxnSp>
       <p:cxnSp>
         <p:nvCxnSpPr>
-          <p:cNvPr id="8" name="Conector reto 7">
+          <p:cNvPr id="99" name="Conector reto 98">
             <a:extLst>
               <a:ext uri="{FF2B5EF4-FFF2-40B4-BE49-F238E27FC236}">
-                <a16:creationId xmlns:a16="http://schemas.microsoft.com/office/drawing/2014/main" id="{1A84A5C4-1ABC-4066-9FF7-2168D5C1DD1D}"/>
+                <a16:creationId xmlns:a16="http://schemas.microsoft.com/office/drawing/2014/main" id="{30F5EBF7-BEBB-4856-B0FB-BF2C7F037A5C}"/>
               </a:ext>
             </a:extLst>
           </p:cNvPr>
           <p:cNvCxnSpPr>
             <a:cxnSpLocks/>
-            <a:stCxn id="23" idx="0"/>
           </p:cNvCxnSpPr>
           <p:nvPr/>
         </p:nvCxnSpPr>
         <p:spPr>
           <a:xfrm flipV="1">
-            <a:off x="4191497" y="3653824"/>
-            <a:ext cx="3" cy="598658"/>
+            <a:off x="7860786" y="1542929"/>
+            <a:ext cx="670291" cy="7951"/>
           </a:xfrm>
           <a:prstGeom prst="line">
             <a:avLst/>
@@ -6822,23 +6913,23 @@
       </p:cxnSp>
       <p:cxnSp>
         <p:nvCxnSpPr>
-          <p:cNvPr id="47" name="Conector reto 46">
+          <p:cNvPr id="100" name="Conector reto 99">
             <a:extLst>
               <a:ext uri="{FF2B5EF4-FFF2-40B4-BE49-F238E27FC236}">
-                <a16:creationId xmlns:a16="http://schemas.microsoft.com/office/drawing/2014/main" id="{0473CC43-5297-403B-8864-36DB699955F5}"/>
+                <a16:creationId xmlns:a16="http://schemas.microsoft.com/office/drawing/2014/main" id="{D3371320-0DBC-4D95-8932-147CCE7CFE09}"/>
               </a:ext>
             </a:extLst>
           </p:cNvPr>
           <p:cNvCxnSpPr>
             <a:cxnSpLocks/>
-            <a:stCxn id="90" idx="0"/>
+            <a:endCxn id="77" idx="1"/>
           </p:cNvCxnSpPr>
           <p:nvPr/>
         </p:nvCxnSpPr>
         <p:spPr>
-          <a:xfrm flipV="1">
-            <a:off x="6413893" y="3645975"/>
-            <a:ext cx="0" cy="585012"/>
+          <a:xfrm>
+            <a:off x="7858564" y="3541618"/>
+            <a:ext cx="672513" cy="1"/>
           </a:xfrm>
           <a:prstGeom prst="line">
             <a:avLst/>
@@ -6864,23 +6955,22 @@
       </p:cxnSp>
       <p:cxnSp>
         <p:nvCxnSpPr>
-          <p:cNvPr id="51" name="Conector reto 50">
+          <p:cNvPr id="101" name="Conector reto 100">
             <a:extLst>
               <a:ext uri="{FF2B5EF4-FFF2-40B4-BE49-F238E27FC236}">
-                <a16:creationId xmlns:a16="http://schemas.microsoft.com/office/drawing/2014/main" id="{5164F04D-B418-4018-8C6F-56713638CF9C}"/>
+                <a16:creationId xmlns:a16="http://schemas.microsoft.com/office/drawing/2014/main" id="{617D6E3C-0382-49CA-B9E2-8A91362EA1D7}"/>
               </a:ext>
             </a:extLst>
           </p:cNvPr>
           <p:cNvCxnSpPr>
             <a:cxnSpLocks/>
-            <a:stCxn id="119" idx="0"/>
           </p:cNvCxnSpPr>
           <p:nvPr/>
         </p:nvCxnSpPr>
         <p:spPr>
           <a:xfrm flipV="1">
-            <a:off x="8652792" y="3645975"/>
-            <a:ext cx="0" cy="606507"/>
+            <a:off x="7858564" y="1714301"/>
+            <a:ext cx="0" cy="1809487"/>
           </a:xfrm>
           <a:prstGeom prst="line">
             <a:avLst/>
@@ -6906,106 +6996,23 @@
       </p:cxnSp>
       <p:cxnSp>
         <p:nvCxnSpPr>
-          <p:cNvPr id="54" name="Conector reto 53">
+          <p:cNvPr id="102" name="Conector de Seta Reta 107">
             <a:extLst>
               <a:ext uri="{FF2B5EF4-FFF2-40B4-BE49-F238E27FC236}">
-                <a16:creationId xmlns:a16="http://schemas.microsoft.com/office/drawing/2014/main" id="{1A65B6B0-2982-4353-9231-2AAF78A09C79}"/>
+                <a16:creationId xmlns:a16="http://schemas.microsoft.com/office/drawing/2014/main" id="{6C27B9CB-D17A-4BBC-A446-7EB01B64E6F4}"/>
               </a:ext>
             </a:extLst>
           </p:cNvPr>
           <p:cNvCxnSpPr>
             <a:cxnSpLocks/>
-            <a:stCxn id="63" idx="0"/>
-          </p:cNvCxnSpPr>
-          <p:nvPr/>
-        </p:nvCxnSpPr>
-        <p:spPr>
-          <a:xfrm flipV="1">
-            <a:off x="10951476" y="3653824"/>
-            <a:ext cx="0" cy="595023"/>
-          </a:xfrm>
-          <a:prstGeom prst="line">
-            <a:avLst/>
-          </a:prstGeom>
-          <a:ln w="19050">
-            <a:prstDash val="sysDash"/>
-          </a:ln>
-        </p:spPr>
-        <p:style>
-          <a:lnRef idx="1">
-            <a:schemeClr val="accent1"/>
-          </a:lnRef>
-          <a:fillRef idx="0">
-            <a:schemeClr val="accent1"/>
-          </a:fillRef>
-          <a:effectRef idx="0">
-            <a:schemeClr val="accent1"/>
-          </a:effectRef>
-          <a:fontRef idx="minor">
-            <a:schemeClr val="tx1"/>
-          </a:fontRef>
-        </p:style>
-      </p:cxnSp>
-      <p:cxnSp>
-        <p:nvCxnSpPr>
-          <p:cNvPr id="56" name="Conector reto 55">
-            <a:extLst>
-              <a:ext uri="{FF2B5EF4-FFF2-40B4-BE49-F238E27FC236}">
-                <a16:creationId xmlns:a16="http://schemas.microsoft.com/office/drawing/2014/main" id="{CFF97977-CFB8-4597-9EF3-64CB1E8F1707}"/>
-              </a:ext>
-            </a:extLst>
-          </p:cNvPr>
-          <p:cNvCxnSpPr>
-            <a:cxnSpLocks/>
+            <a:endCxn id="69" idx="3"/>
           </p:cNvCxnSpPr>
           <p:nvPr/>
         </p:nvCxnSpPr>
         <p:spPr>
           <a:xfrm flipH="1">
-            <a:off x="4183215" y="3645975"/>
-            <a:ext cx="6768261" cy="0"/>
-          </a:xfrm>
-          <a:prstGeom prst="line">
-            <a:avLst/>
-          </a:prstGeom>
-          <a:ln w="19050">
-            <a:prstDash val="sysDash"/>
-          </a:ln>
-        </p:spPr>
-        <p:style>
-          <a:lnRef idx="1">
-            <a:schemeClr val="accent1"/>
-          </a:lnRef>
-          <a:fillRef idx="0">
-            <a:schemeClr val="accent1"/>
-          </a:fillRef>
-          <a:effectRef idx="0">
-            <a:schemeClr val="accent1"/>
-          </a:effectRef>
-          <a:fontRef idx="minor">
-            <a:schemeClr val="tx1"/>
-          </a:fontRef>
-        </p:style>
-      </p:cxnSp>
-      <p:cxnSp>
-        <p:nvCxnSpPr>
-          <p:cNvPr id="85" name="Conector de Seta Reta 107">
-            <a:extLst>
-              <a:ext uri="{FF2B5EF4-FFF2-40B4-BE49-F238E27FC236}">
-                <a16:creationId xmlns:a16="http://schemas.microsoft.com/office/drawing/2014/main" id="{FEB0ADF2-7669-4299-BD2C-0CD36E65C582}"/>
-              </a:ext>
-            </a:extLst>
-          </p:cNvPr>
-          <p:cNvCxnSpPr>
-            <a:cxnSpLocks/>
-            <a:endCxn id="18" idx="2"/>
-          </p:cNvCxnSpPr>
-          <p:nvPr/>
-        </p:nvCxnSpPr>
-        <p:spPr>
-          <a:xfrm flipV="1">
-            <a:off x="7694308" y="2866809"/>
-            <a:ext cx="4659" cy="787015"/>
+            <a:off x="7236720" y="2318928"/>
+            <a:ext cx="621844" cy="0"/>
           </a:xfrm>
           <a:prstGeom prst="straightConnector1">
             <a:avLst/>
@@ -7075,7 +7082,7 @@
                                           </p:stCondLst>
                                         </p:cTn>
                                         <p:tgtEl>
-                                          <p:spTgt spid="14"/>
+                                          <p:spTgt spid="62"/>
                                         </p:tgtEl>
                                         <p:attrNameLst>
                                           <p:attrName>style.visibility</p:attrName>
@@ -7102,7 +7109,7 @@
                                           </p:stCondLst>
                                         </p:cTn>
                                         <p:tgtEl>
-                                          <p:spTgt spid="17"/>
+                                          <p:spTgt spid="68"/>
                                         </p:tgtEl>
                                         <p:attrNameLst>
                                           <p:attrName>style.visibility</p:attrName>
@@ -7147,7 +7154,7 @@
                                           </p:stCondLst>
                                         </p:cTn>
                                         <p:tgtEl>
-                                          <p:spTgt spid="89"/>
+                                          <p:spTgt spid="72"/>
                                         </p:tgtEl>
                                         <p:attrNameLst>
                                           <p:attrName>style.visibility</p:attrName>
@@ -7192,7 +7199,7 @@
                                           </p:stCondLst>
                                         </p:cTn>
                                         <p:tgtEl>
-                                          <p:spTgt spid="118"/>
+                                          <p:spTgt spid="76"/>
                                         </p:tgtEl>
                                         <p:attrNameLst>
                                           <p:attrName>style.visibility</p:attrName>
@@ -7237,7 +7244,7 @@
                                           </p:stCondLst>
                                         </p:cTn>
                                         <p:tgtEl>
-                                          <p:spTgt spid="22"/>
+                                          <p:spTgt spid="80"/>
                                         </p:tgtEl>
                                         <p:attrNameLst>
                                           <p:attrName>style.visibility</p:attrName>
@@ -7282,7 +7289,7 @@
                                           </p:stCondLst>
                                         </p:cTn>
                                         <p:tgtEl>
-                                          <p:spTgt spid="61"/>
+                                          <p:spTgt spid="84"/>
                                         </p:tgtEl>
                                         <p:attrNameLst>
                                           <p:attrName>style.visibility</p:attrName>
@@ -7327,7 +7334,7 @@
                                           </p:stCondLst>
                                         </p:cTn>
                                         <p:tgtEl>
-                                          <p:spTgt spid="30"/>
+                                          <p:spTgt spid="94"/>
                                         </p:tgtEl>
                                         <p:attrNameLst>
                                           <p:attrName>style.visibility</p:attrName>
@@ -7372,7 +7379,7 @@
                                           </p:stCondLst>
                                         </p:cTn>
                                         <p:tgtEl>
-                                          <p:spTgt spid="46"/>
+                                          <p:spTgt spid="98"/>
                                         </p:tgtEl>
                                         <p:attrNameLst>
                                           <p:attrName>style.visibility</p:attrName>
@@ -7417,52 +7424,7 @@
                                           </p:stCondLst>
                                         </p:cTn>
                                         <p:tgtEl>
-                                          <p:spTgt spid="49"/>
-                                        </p:tgtEl>
-                                        <p:attrNameLst>
-                                          <p:attrName>style.visibility</p:attrName>
-                                        </p:attrNameLst>
-                                      </p:cBhvr>
-                                      <p:to>
-                                        <p:strVal val="visible"/>
-                                      </p:to>
-                                    </p:set>
-                                  </p:childTnLst>
-                                </p:cTn>
-                              </p:par>
-                            </p:childTnLst>
-                          </p:cTn>
-                        </p:par>
-                      </p:childTnLst>
-                    </p:cTn>
-                  </p:par>
-                  <p:par>
-                    <p:cTn id="37" fill="hold">
-                      <p:stCondLst>
-                        <p:cond delay="indefinite"/>
-                      </p:stCondLst>
-                      <p:childTnLst>
-                        <p:par>
-                          <p:cTn id="38" fill="hold">
-                            <p:stCondLst>
-                              <p:cond delay="0"/>
-                            </p:stCondLst>
-                            <p:childTnLst>
-                              <p:par>
-                                <p:cTn id="39" presetID="1" presetClass="entr" presetSubtype="0" fill="hold" nodeType="clickEffect">
-                                  <p:stCondLst>
-                                    <p:cond delay="0"/>
-                                  </p:stCondLst>
-                                  <p:childTnLst>
-                                    <p:set>
-                                      <p:cBhvr>
-                                        <p:cTn id="40" dur="1" fill="hold">
-                                          <p:stCondLst>
-                                            <p:cond delay="0"/>
-                                          </p:stCondLst>
-                                        </p:cTn>
-                                        <p:tgtEl>
-                                          <p:spTgt spid="85"/>
+                                          <p:spTgt spid="102"/>
                                         </p:tgtEl>
                                         <p:attrNameLst>
                                           <p:attrName>style.visibility</p:attrName>
@@ -7503,7 +7465,7 @@
       </p:par>
     </p:tnLst>
     <p:bldLst>
-      <p:bldP spid="14" grpId="0" bldLvl="0" animBg="1"/>
+      <p:bldP spid="62" grpId="0" bldLvl="0" animBg="1"/>
     </p:bldLst>
   </p:timing>
 </p:sld>

</xml_diff>

<commit_message>
att solução de componentes
</commit_message>
<xml_diff>
--- a/documentacao/desenho-de-solução/Solucao_do_Projeto_com_Containers_componentes.pptx
+++ b/documentacao/desenho-de-solução/Solucao_do_Projeto_com_Containers_componentes.pptx
@@ -6885,9 +6885,9 @@
           <p:nvPr/>
         </p:nvCxnSpPr>
         <p:spPr>
-          <a:xfrm flipV="1">
-            <a:off x="7860786" y="1542929"/>
-            <a:ext cx="670291" cy="7951"/>
+          <a:xfrm>
+            <a:off x="7858125" y="1514475"/>
+            <a:ext cx="660496" cy="16087"/>
           </a:xfrm>
           <a:prstGeom prst="line">
             <a:avLst/>
@@ -6969,8 +6969,8 @@
         </p:nvCxnSpPr>
         <p:spPr>
           <a:xfrm flipV="1">
-            <a:off x="7858564" y="1714301"/>
-            <a:ext cx="0" cy="1809487"/>
+            <a:off x="7836338" y="1528188"/>
+            <a:ext cx="22226" cy="2012632"/>
           </a:xfrm>
           <a:prstGeom prst="line">
             <a:avLst/>
@@ -7012,7 +7012,7 @@
         <p:spPr>
           <a:xfrm flipH="1">
             <a:off x="7236720" y="2318928"/>
-            <a:ext cx="621844" cy="0"/>
+            <a:ext cx="599618" cy="0"/>
           </a:xfrm>
           <a:prstGeom prst="straightConnector1">
             <a:avLst/>

</xml_diff>